<commit_message>
Remove sidebar from Data Pipeline dashboard for full-width view
</commit_message>
<xml_diff>
--- a/HiLabsTM.pptx
+++ b/HiLabsTM.pptx
@@ -4,6 +4,9 @@
   <p:sldMasterIdLst>
     <p:sldMasterId id="2147483648" r:id="rId1"/>
   </p:sldMasterIdLst>
+  <p:notesMasterIdLst>
+    <p:notesMasterId r:id="rId12"/>
+  </p:notesMasterIdLst>
   <p:sldIdLst>
     <p:sldId id="256" r:id="rId2"/>
     <p:sldId id="257" r:id="rId3"/>
@@ -560,6 +563,440 @@
 </pc:chgInfo>
 </file>
 
+<file path=ppt/notesMasters/notesMaster1.xml><?xml version="1.0" encoding="utf-8"?>
+<p:notesMaster xmlns:a="http://schemas.openxmlformats.org/drawingml/2006/main" xmlns:r="http://schemas.openxmlformats.org/officeDocument/2006/relationships" xmlns:p="http://schemas.openxmlformats.org/presentationml/2006/main">
+  <p:cSld>
+    <p:bg>
+      <p:bgRef idx="1001">
+        <a:schemeClr val="bg1"/>
+      </p:bgRef>
+    </p:bg>
+    <p:spTree>
+      <p:nvGrpSpPr>
+        <p:cNvPr id="1" name=""/>
+        <p:cNvGrpSpPr/>
+        <p:nvPr/>
+      </p:nvGrpSpPr>
+      <p:grpSpPr>
+        <a:xfrm>
+          <a:off x="0" y="0"/>
+          <a:ext cx="0" cy="0"/>
+          <a:chOff x="0" y="0"/>
+          <a:chExt cx="0" cy="0"/>
+        </a:xfrm>
+      </p:grpSpPr>
+      <p:sp>
+        <p:nvSpPr>
+          <p:cNvPr id="2" name="Header Placeholder 1"/>
+          <p:cNvSpPr>
+            <a:spLocks noGrp="1"/>
+          </p:cNvSpPr>
+          <p:nvPr>
+            <p:ph type="hdr" sz="quarter"/>
+          </p:nvPr>
+        </p:nvSpPr>
+        <p:spPr>
+          <a:xfrm>
+            <a:off x="0" y="0"/>
+            <a:ext cx="2971800" cy="458788"/>
+          </a:xfrm>
+          <a:prstGeom prst="rect">
+            <a:avLst/>
+          </a:prstGeom>
+        </p:spPr>
+        <p:txBody>
+          <a:bodyPr vert="horz" lIns="91440" tIns="45720" rIns="91440" bIns="45720" rtlCol="0"/>
+          <a:lstStyle>
+            <a:lvl1pPr algn="l">
+              <a:defRPr sz="1200"/>
+            </a:lvl1pPr>
+          </a:lstStyle>
+          <a:p>
+            <a:endParaRPr lang="en-US"/>
+          </a:p>
+        </p:txBody>
+      </p:sp>
+      <p:sp>
+        <p:nvSpPr>
+          <p:cNvPr id="3" name="Date Placeholder 2"/>
+          <p:cNvSpPr>
+            <a:spLocks noGrp="1"/>
+          </p:cNvSpPr>
+          <p:nvPr>
+            <p:ph type="dt" idx="1"/>
+          </p:nvPr>
+        </p:nvSpPr>
+        <p:spPr>
+          <a:xfrm>
+            <a:off x="3884613" y="0"/>
+            <a:ext cx="2971800" cy="458788"/>
+          </a:xfrm>
+          <a:prstGeom prst="rect">
+            <a:avLst/>
+          </a:prstGeom>
+        </p:spPr>
+        <p:txBody>
+          <a:bodyPr vert="horz" lIns="91440" tIns="45720" rIns="91440" bIns="45720" rtlCol="0"/>
+          <a:lstStyle>
+            <a:lvl1pPr algn="r">
+              <a:defRPr sz="1200"/>
+            </a:lvl1pPr>
+          </a:lstStyle>
+          <a:p>
+            <a:fld id="{B9539219-0BF5-40A8-BF7C-7D8A48B2B27E}" type="datetimeFigureOut">
+              <a:rPr lang="en-US" smtClean="0"/>
+              <a:t>11/7/2025</a:t>
+            </a:fld>
+            <a:endParaRPr lang="en-US"/>
+          </a:p>
+        </p:txBody>
+      </p:sp>
+      <p:sp>
+        <p:nvSpPr>
+          <p:cNvPr id="4" name="Slide Image Placeholder 3"/>
+          <p:cNvSpPr>
+            <a:spLocks noGrp="1" noRot="1" noChangeAspect="1"/>
+          </p:cNvSpPr>
+          <p:nvPr>
+            <p:ph type="sldImg" idx="2"/>
+          </p:nvPr>
+        </p:nvSpPr>
+        <p:spPr>
+          <a:xfrm>
+            <a:off x="685800" y="1143000"/>
+            <a:ext cx="5486400" cy="3086100"/>
+          </a:xfrm>
+          <a:prstGeom prst="rect">
+            <a:avLst/>
+          </a:prstGeom>
+          <a:noFill/>
+          <a:ln w="12700">
+            <a:solidFill>
+              <a:prstClr val="black"/>
+            </a:solidFill>
+          </a:ln>
+        </p:spPr>
+        <p:txBody>
+          <a:bodyPr vert="horz" lIns="91440" tIns="45720" rIns="91440" bIns="45720" rtlCol="0" anchor="ctr"/>
+          <a:lstStyle/>
+          <a:p>
+            <a:endParaRPr lang="en-US"/>
+          </a:p>
+        </p:txBody>
+      </p:sp>
+      <p:sp>
+        <p:nvSpPr>
+          <p:cNvPr id="5" name="Notes Placeholder 4"/>
+          <p:cNvSpPr>
+            <a:spLocks noGrp="1"/>
+          </p:cNvSpPr>
+          <p:nvPr>
+            <p:ph type="body" sz="quarter" idx="3"/>
+          </p:nvPr>
+        </p:nvSpPr>
+        <p:spPr>
+          <a:xfrm>
+            <a:off x="685800" y="4400550"/>
+            <a:ext cx="5486400" cy="3600450"/>
+          </a:xfrm>
+          <a:prstGeom prst="rect">
+            <a:avLst/>
+          </a:prstGeom>
+        </p:spPr>
+        <p:txBody>
+          <a:bodyPr vert="horz" lIns="91440" tIns="45720" rIns="91440" bIns="45720" rtlCol="0"/>
+          <a:lstStyle/>
+          <a:p>
+            <a:pPr lvl="0"/>
+            <a:r>
+              <a:rPr lang="en-US" smtClean="0"/>
+              <a:t>Edit Master text styles</a:t>
+            </a:r>
+          </a:p>
+          <a:p>
+            <a:pPr lvl="1"/>
+            <a:r>
+              <a:rPr lang="en-US" smtClean="0"/>
+              <a:t>Second level</a:t>
+            </a:r>
+          </a:p>
+          <a:p>
+            <a:pPr lvl="2"/>
+            <a:r>
+              <a:rPr lang="en-US" smtClean="0"/>
+              <a:t>Third level</a:t>
+            </a:r>
+          </a:p>
+          <a:p>
+            <a:pPr lvl="3"/>
+            <a:r>
+              <a:rPr lang="en-US" smtClean="0"/>
+              <a:t>Fourth level</a:t>
+            </a:r>
+          </a:p>
+          <a:p>
+            <a:pPr lvl="4"/>
+            <a:r>
+              <a:rPr lang="en-US" smtClean="0"/>
+              <a:t>Fifth level</a:t>
+            </a:r>
+            <a:endParaRPr lang="en-US"/>
+          </a:p>
+        </p:txBody>
+      </p:sp>
+      <p:sp>
+        <p:nvSpPr>
+          <p:cNvPr id="6" name="Footer Placeholder 5"/>
+          <p:cNvSpPr>
+            <a:spLocks noGrp="1"/>
+          </p:cNvSpPr>
+          <p:nvPr>
+            <p:ph type="ftr" sz="quarter" idx="4"/>
+          </p:nvPr>
+        </p:nvSpPr>
+        <p:spPr>
+          <a:xfrm>
+            <a:off x="0" y="8685213"/>
+            <a:ext cx="2971800" cy="458787"/>
+          </a:xfrm>
+          <a:prstGeom prst="rect">
+            <a:avLst/>
+          </a:prstGeom>
+        </p:spPr>
+        <p:txBody>
+          <a:bodyPr vert="horz" lIns="91440" tIns="45720" rIns="91440" bIns="45720" rtlCol="0" anchor="b"/>
+          <a:lstStyle>
+            <a:lvl1pPr algn="l">
+              <a:defRPr sz="1200"/>
+            </a:lvl1pPr>
+          </a:lstStyle>
+          <a:p>
+            <a:endParaRPr lang="en-US"/>
+          </a:p>
+        </p:txBody>
+      </p:sp>
+      <p:sp>
+        <p:nvSpPr>
+          <p:cNvPr id="7" name="Slide Number Placeholder 6"/>
+          <p:cNvSpPr>
+            <a:spLocks noGrp="1"/>
+          </p:cNvSpPr>
+          <p:nvPr>
+            <p:ph type="sldNum" sz="quarter" idx="5"/>
+          </p:nvPr>
+        </p:nvSpPr>
+        <p:spPr>
+          <a:xfrm>
+            <a:off x="3884613" y="8685213"/>
+            <a:ext cx="2971800" cy="458787"/>
+          </a:xfrm>
+          <a:prstGeom prst="rect">
+            <a:avLst/>
+          </a:prstGeom>
+        </p:spPr>
+        <p:txBody>
+          <a:bodyPr vert="horz" lIns="91440" tIns="45720" rIns="91440" bIns="45720" rtlCol="0" anchor="b"/>
+          <a:lstStyle>
+            <a:lvl1pPr algn="r">
+              <a:defRPr sz="1200"/>
+            </a:lvl1pPr>
+          </a:lstStyle>
+          <a:p>
+            <a:fld id="{D724CF94-FCE0-43B1-B205-6CF5B30423E6}" type="slidenum">
+              <a:rPr lang="en-US" smtClean="0"/>
+              <a:t>‹#›</a:t>
+            </a:fld>
+            <a:endParaRPr lang="en-US"/>
+          </a:p>
+        </p:txBody>
+      </p:sp>
+    </p:spTree>
+    <p:extLst>
+      <p:ext uri="{BB962C8B-B14F-4D97-AF65-F5344CB8AC3E}">
+        <p14:creationId xmlns:p14="http://schemas.microsoft.com/office/powerpoint/2010/main" val="443715951"/>
+      </p:ext>
+    </p:extLst>
+  </p:cSld>
+  <p:clrMap bg1="lt1" tx1="dk1" bg2="lt2" tx2="dk2" accent1="accent1" accent2="accent2" accent3="accent3" accent4="accent4" accent5="accent5" accent6="accent6" hlink="hlink" folHlink="folHlink"/>
+  <p:notesStyle>
+    <a:lvl1pPr marL="0" algn="l" defTabSz="914400" rtl="0" eaLnBrk="1" latinLnBrk="0" hangingPunct="1">
+      <a:defRPr sz="1200" kern="1200">
+        <a:solidFill>
+          <a:schemeClr val="tx1"/>
+        </a:solidFill>
+        <a:latin typeface="+mn-lt"/>
+        <a:ea typeface="+mn-ea"/>
+        <a:cs typeface="+mn-cs"/>
+      </a:defRPr>
+    </a:lvl1pPr>
+    <a:lvl2pPr marL="457200" algn="l" defTabSz="914400" rtl="0" eaLnBrk="1" latinLnBrk="0" hangingPunct="1">
+      <a:defRPr sz="1200" kern="1200">
+        <a:solidFill>
+          <a:schemeClr val="tx1"/>
+        </a:solidFill>
+        <a:latin typeface="+mn-lt"/>
+        <a:ea typeface="+mn-ea"/>
+        <a:cs typeface="+mn-cs"/>
+      </a:defRPr>
+    </a:lvl2pPr>
+    <a:lvl3pPr marL="914400" algn="l" defTabSz="914400" rtl="0" eaLnBrk="1" latinLnBrk="0" hangingPunct="1">
+      <a:defRPr sz="1200" kern="1200">
+        <a:solidFill>
+          <a:schemeClr val="tx1"/>
+        </a:solidFill>
+        <a:latin typeface="+mn-lt"/>
+        <a:ea typeface="+mn-ea"/>
+        <a:cs typeface="+mn-cs"/>
+      </a:defRPr>
+    </a:lvl3pPr>
+    <a:lvl4pPr marL="1371600" algn="l" defTabSz="914400" rtl="0" eaLnBrk="1" latinLnBrk="0" hangingPunct="1">
+      <a:defRPr sz="1200" kern="1200">
+        <a:solidFill>
+          <a:schemeClr val="tx1"/>
+        </a:solidFill>
+        <a:latin typeface="+mn-lt"/>
+        <a:ea typeface="+mn-ea"/>
+        <a:cs typeface="+mn-cs"/>
+      </a:defRPr>
+    </a:lvl4pPr>
+    <a:lvl5pPr marL="1828800" algn="l" defTabSz="914400" rtl="0" eaLnBrk="1" latinLnBrk="0" hangingPunct="1">
+      <a:defRPr sz="1200" kern="1200">
+        <a:solidFill>
+          <a:schemeClr val="tx1"/>
+        </a:solidFill>
+        <a:latin typeface="+mn-lt"/>
+        <a:ea typeface="+mn-ea"/>
+        <a:cs typeface="+mn-cs"/>
+      </a:defRPr>
+    </a:lvl5pPr>
+    <a:lvl6pPr marL="2286000" algn="l" defTabSz="914400" rtl="0" eaLnBrk="1" latinLnBrk="0" hangingPunct="1">
+      <a:defRPr sz="1200" kern="1200">
+        <a:solidFill>
+          <a:schemeClr val="tx1"/>
+        </a:solidFill>
+        <a:latin typeface="+mn-lt"/>
+        <a:ea typeface="+mn-ea"/>
+        <a:cs typeface="+mn-cs"/>
+      </a:defRPr>
+    </a:lvl6pPr>
+    <a:lvl7pPr marL="2743200" algn="l" defTabSz="914400" rtl="0" eaLnBrk="1" latinLnBrk="0" hangingPunct="1">
+      <a:defRPr sz="1200" kern="1200">
+        <a:solidFill>
+          <a:schemeClr val="tx1"/>
+        </a:solidFill>
+        <a:latin typeface="+mn-lt"/>
+        <a:ea typeface="+mn-ea"/>
+        <a:cs typeface="+mn-cs"/>
+      </a:defRPr>
+    </a:lvl7pPr>
+    <a:lvl8pPr marL="3200400" algn="l" defTabSz="914400" rtl="0" eaLnBrk="1" latinLnBrk="0" hangingPunct="1">
+      <a:defRPr sz="1200" kern="1200">
+        <a:solidFill>
+          <a:schemeClr val="tx1"/>
+        </a:solidFill>
+        <a:latin typeface="+mn-lt"/>
+        <a:ea typeface="+mn-ea"/>
+        <a:cs typeface="+mn-cs"/>
+      </a:defRPr>
+    </a:lvl8pPr>
+    <a:lvl9pPr marL="3657600" algn="l" defTabSz="914400" rtl="0" eaLnBrk="1" latinLnBrk="0" hangingPunct="1">
+      <a:defRPr sz="1200" kern="1200">
+        <a:solidFill>
+          <a:schemeClr val="tx1"/>
+        </a:solidFill>
+        <a:latin typeface="+mn-lt"/>
+        <a:ea typeface="+mn-ea"/>
+        <a:cs typeface="+mn-cs"/>
+      </a:defRPr>
+    </a:lvl9pPr>
+  </p:notesStyle>
+</p:notesMaster>
+</file>
+
+<file path=ppt/notesSlides/notesSlide1.xml><?xml version="1.0" encoding="utf-8"?>
+<p:notes xmlns:a="http://schemas.openxmlformats.org/drawingml/2006/main" xmlns:r="http://schemas.openxmlformats.org/officeDocument/2006/relationships" xmlns:p="http://schemas.openxmlformats.org/presentationml/2006/main">
+  <p:cSld>
+    <p:spTree>
+      <p:nvGrpSpPr>
+        <p:cNvPr id="1" name=""/>
+        <p:cNvGrpSpPr/>
+        <p:nvPr/>
+      </p:nvGrpSpPr>
+      <p:grpSpPr>
+        <a:xfrm>
+          <a:off x="0" y="0"/>
+          <a:ext cx="0" cy="0"/>
+          <a:chOff x="0" y="0"/>
+          <a:chExt cx="0" cy="0"/>
+        </a:xfrm>
+      </p:grpSpPr>
+      <p:sp>
+        <p:nvSpPr>
+          <p:cNvPr id="2" name="Slide Image Placeholder 1"/>
+          <p:cNvSpPr>
+            <a:spLocks noGrp="1" noRot="1" noChangeAspect="1"/>
+          </p:cNvSpPr>
+          <p:nvPr>
+            <p:ph type="sldImg"/>
+          </p:nvPr>
+        </p:nvSpPr>
+        <p:spPr/>
+      </p:sp>
+      <p:sp>
+        <p:nvSpPr>
+          <p:cNvPr id="3" name="Notes Placeholder 2"/>
+          <p:cNvSpPr>
+            <a:spLocks noGrp="1"/>
+          </p:cNvSpPr>
+          <p:nvPr>
+            <p:ph type="body" idx="1"/>
+          </p:nvPr>
+        </p:nvSpPr>
+        <p:spPr/>
+        <p:txBody>
+          <a:bodyPr/>
+          <a:lstStyle/>
+          <a:p>
+            <a:endParaRPr lang="en-US" dirty="0"/>
+          </a:p>
+        </p:txBody>
+      </p:sp>
+      <p:sp>
+        <p:nvSpPr>
+          <p:cNvPr id="4" name="Slide Number Placeholder 3"/>
+          <p:cNvSpPr>
+            <a:spLocks noGrp="1"/>
+          </p:cNvSpPr>
+          <p:nvPr>
+            <p:ph type="sldNum" sz="quarter" idx="10"/>
+          </p:nvPr>
+        </p:nvSpPr>
+        <p:spPr/>
+        <p:txBody>
+          <a:bodyPr/>
+          <a:lstStyle/>
+          <a:p>
+            <a:fld id="{D724CF94-FCE0-43B1-B205-6CF5B30423E6}" type="slidenum">
+              <a:rPr lang="en-US" smtClean="0"/>
+              <a:t>4</a:t>
+            </a:fld>
+            <a:endParaRPr lang="en-US"/>
+          </a:p>
+        </p:txBody>
+      </p:sp>
+    </p:spTree>
+    <p:extLst>
+      <p:ext uri="{BB962C8B-B14F-4D97-AF65-F5344CB8AC3E}">
+        <p14:creationId xmlns:p14="http://schemas.microsoft.com/office/powerpoint/2010/main" val="1574663124"/>
+      </p:ext>
+    </p:extLst>
+  </p:cSld>
+  <p:clrMapOvr>
+    <a:masterClrMapping/>
+  </p:clrMapOvr>
+</p:notes>
+</file>
+
 <file path=ppt/slideLayouts/slideLayout1.xml><?xml version="1.0" encoding="utf-8"?>
 <p:sldLayout xmlns:a="http://schemas.openxmlformats.org/drawingml/2006/main" xmlns:r="http://schemas.openxmlformats.org/officeDocument/2006/relationships" xmlns:p="http://schemas.openxmlformats.org/presentationml/2006/main" type="title" preserve="1">
   <p:cSld name="Title Slide">
@@ -3866,6 +4303,13 @@
   <p:clrMapOvr>
     <a:masterClrMapping/>
   </p:clrMapOvr>
+  <p:timing>
+    <p:tnLst>
+      <p:par>
+        <p:cTn id="1" dur="indefinite" restart="never" nodeType="tmRoot"/>
+      </p:par>
+    </p:tnLst>
+  </p:timing>
 </p:sld>
 </file>
 
@@ -4016,7 +4460,7 @@
         <p:spPr>
           <a:xfrm>
             <a:off x="184638" y="754053"/>
-            <a:ext cx="11937023" cy="830997"/>
+            <a:ext cx="11937023" cy="738664"/>
           </a:xfrm>
           <a:prstGeom prst="rect">
             <a:avLst/>
@@ -4031,25 +4475,25 @@
           <a:p>
             <a:pPr algn="just"/>
             <a:r>
-              <a:rPr lang="en-US" sz="1600" dirty="0"/>
+              <a:rPr lang="en-US" sz="1400" dirty="0"/>
               <a:t>Payers face opaque, </a:t>
             </a:r>
             <a:r>
-              <a:rPr lang="en-US" sz="1600" dirty="0" err="1">
+              <a:rPr lang="en-US" sz="1400" dirty="0" err="1">
                 <a:hlinkClick r:id="rId2"/>
               </a:rPr>
               <a:t>inconsitent</a:t>
             </a:r>
             <a:r>
-              <a:rPr lang="en-US" sz="1600" dirty="0"/>
+              <a:rPr lang="en-US" sz="1400" dirty="0"/>
               <a:t> pricing and lack a unified view to benchmark provider rates, understand risk-adjusted cost trends, and identify network adequacy gaps. Even with CMS </a:t>
             </a:r>
             <a:r>
-              <a:rPr lang="en-US" sz="1600" dirty="0" err="1"/>
+              <a:rPr lang="en-US" sz="1400" dirty="0" err="1"/>
               <a:t>TiC</a:t>
             </a:r>
             <a:r>
-              <a:rPr lang="en-US" sz="1600" dirty="0"/>
+              <a:rPr lang="en-US" sz="1400" dirty="0"/>
               <a:t>/MRF and Hospital Price Transparency data, the files are massive and heterogeneous, and analysis requires complex normalization and linkage with claims and provider directories—creating integration and operational friction.</a:t>
             </a:r>
           </a:p>
@@ -4113,7 +4557,7 @@
         <p:spPr>
           <a:xfrm>
             <a:off x="1" y="2066302"/>
-            <a:ext cx="5495192" cy="3539430"/>
+            <a:ext cx="5495192" cy="2677656"/>
           </a:xfrm>
           <a:prstGeom prst="rect">
             <a:avLst/>
@@ -4137,11 +4581,11 @@
               <a:buChar char="•"/>
             </a:pPr>
             <a:r>
-              <a:rPr lang="en-US" sz="1600" b="1" dirty="0"/>
+              <a:rPr lang="en-US" sz="1400" b="1" dirty="0"/>
               <a:t>Siloed datasets</a:t>
             </a:r>
             <a:r>
-              <a:rPr lang="en-US" sz="1600" dirty="0"/>
+              <a:rPr lang="en-US" sz="1400" dirty="0"/>
               <a:t> (MRFs, claims, directories not linked)</a:t>
             </a:r>
           </a:p>
@@ -4151,7 +4595,7 @@
               <a:buChar char="v"/>
             </a:pPr>
             <a:r>
-              <a:rPr lang="en-US" sz="1600" dirty="0"/>
+              <a:rPr lang="en-US" sz="1400" dirty="0"/>
               <a:t>Weak negotiation leverage; savings left on the table.</a:t>
             </a:r>
           </a:p>
@@ -4160,7 +4604,7 @@
               <a:buFont typeface="Wingdings" panose="05000000000000000000" pitchFamily="2" charset="2"/>
               <a:buChar char="v"/>
             </a:pPr>
-            <a:endParaRPr lang="en-US" sz="1600" dirty="0"/>
+            <a:endParaRPr lang="en-US" sz="1400" dirty="0"/>
           </a:p>
           <a:p>
             <a:pPr marL="285750" indent="-285750">
@@ -4168,11 +4612,11 @@
               <a:buChar char="•"/>
             </a:pPr>
             <a:r>
-              <a:rPr lang="en-IN" sz="1600" b="1" dirty="0"/>
+              <a:rPr lang="en-IN" sz="1400" b="1" dirty="0"/>
               <a:t>Schema &amp; scale issues in MRFs</a:t>
             </a:r>
             <a:r>
-              <a:rPr lang="en-IN" sz="1600" dirty="0"/>
+              <a:rPr lang="en-IN" sz="1400" dirty="0"/>
               <a:t> (volume/standardization problems)</a:t>
             </a:r>
           </a:p>
@@ -4182,7 +4626,7 @@
               <a:buChar char="v"/>
             </a:pPr>
             <a:r>
-              <a:rPr lang="en-US" sz="1600" dirty="0"/>
+              <a:rPr lang="en-US" sz="1400" dirty="0"/>
               <a:t> Manual/Excel workflows miss outliers and delay decisions.</a:t>
             </a:r>
           </a:p>
@@ -4191,7 +4635,7 @@
               <a:buFont typeface="Wingdings" panose="05000000000000000000" pitchFamily="2" charset="2"/>
               <a:buChar char="v"/>
             </a:pPr>
-            <a:endParaRPr lang="en-US" sz="1600" dirty="0"/>
+            <a:endParaRPr lang="en-US" sz="1400" dirty="0"/>
           </a:p>
           <a:p>
             <a:pPr marL="285750" indent="-285750">
@@ -4199,11 +4643,11 @@
               <a:buChar char="•"/>
             </a:pPr>
             <a:r>
-              <a:rPr lang="en-US" sz="1600" b="1" dirty="0"/>
+              <a:rPr lang="en-US" sz="1400" b="1" dirty="0"/>
               <a:t>No geographic adequacy analytics</a:t>
             </a:r>
             <a:r>
-              <a:rPr lang="en-US" sz="1600" dirty="0"/>
+              <a:rPr lang="en-US" sz="1400" dirty="0"/>
               <a:t> (county/specialty view missing)</a:t>
             </a:r>
           </a:p>
@@ -4213,7 +4657,7 @@
               <a:buChar char="v"/>
             </a:pPr>
             <a:r>
-              <a:rPr lang="en-US" sz="1600" dirty="0"/>
+              <a:rPr lang="en-US" sz="1400" dirty="0"/>
               <a:t>Hidden access risk and compliance exposure</a:t>
             </a:r>
           </a:p>
@@ -4222,7 +4666,7 @@
               <a:buFont typeface="Wingdings" panose="05000000000000000000" pitchFamily="2" charset="2"/>
               <a:buChar char="v"/>
             </a:pPr>
-            <a:endParaRPr lang="en-US" sz="1600" dirty="0"/>
+            <a:endParaRPr lang="en-US" sz="1400" dirty="0"/>
           </a:p>
           <a:p>
             <a:pPr marL="285750" indent="-285750">
@@ -4230,11 +4674,11 @@
               <a:buChar char="•"/>
             </a:pPr>
             <a:r>
-              <a:rPr lang="en-US" sz="1600" b="1" dirty="0"/>
+              <a:rPr lang="en-US" sz="1400" b="1" dirty="0"/>
               <a:t>Static reporting</a:t>
             </a:r>
             <a:r>
-              <a:rPr lang="en-US" sz="1600" dirty="0"/>
+              <a:rPr lang="en-US" sz="1400" dirty="0"/>
               <a:t> (point-in-time extracts, not interactive)</a:t>
             </a:r>
           </a:p>
@@ -4244,13 +4688,13 @@
               <a:buChar char="v"/>
             </a:pPr>
             <a:r>
-              <a:rPr lang="en-US" sz="1600" dirty="0"/>
+              <a:rPr lang="en-US" sz="1400" dirty="0"/>
               <a:t>Slow cycles; decisions based on partial snapshots.</a:t>
             </a:r>
             <a:br>
-              <a:rPr lang="en-US" sz="1600" dirty="0"/>
+              <a:rPr lang="en-US" sz="1400" dirty="0"/>
             </a:br>
-            <a:endParaRPr lang="en-IN" sz="1600" dirty="0"/>
+            <a:endParaRPr lang="en-IN" sz="1400" dirty="0"/>
           </a:p>
         </p:txBody>
       </p:sp>
@@ -4312,7 +4756,7 @@
         <p:spPr>
           <a:xfrm>
             <a:off x="6095999" y="2154114"/>
-            <a:ext cx="5911363" cy="830997"/>
+            <a:ext cx="5911363" cy="738664"/>
           </a:xfrm>
           <a:prstGeom prst="rect">
             <a:avLst/>
@@ -4332,14 +4776,14 @@
           <a:lstStyle/>
           <a:p>
             <a:r>
-              <a:rPr lang="en-IN" sz="1600" dirty="0"/>
+              <a:rPr lang="en-IN" sz="1400" dirty="0"/>
               <a:t>Strategic Impact : </a:t>
             </a:r>
             <a:r>
-              <a:rPr lang="en-US" sz="1600" dirty="0"/>
+              <a:rPr lang="en-US" sz="1400" dirty="0"/>
               <a:t>Shift from reactive to proactive strategy  executives can identify cost, adequacy, and risk trends before they become financial or regulatory issues.</a:t>
             </a:r>
-            <a:endParaRPr lang="en-IN" sz="1600" dirty="0"/>
+            <a:endParaRPr lang="en-IN" sz="1400" dirty="0"/>
           </a:p>
         </p:txBody>
       </p:sp>
@@ -4396,6 +4840,13 @@
   <p:clrMapOvr>
     <a:masterClrMapping/>
   </p:clrMapOvr>
+  <p:timing>
+    <p:tnLst>
+      <p:par>
+        <p:cTn id="1" dur="indefinite" restart="never" nodeType="tmRoot"/>
+      </p:par>
+    </p:tnLst>
+  </p:timing>
 </p:sld>
 </file>
 
@@ -5047,6 +5498,13 @@
   <p:clrMapOvr>
     <a:masterClrMapping/>
   </p:clrMapOvr>
+  <p:timing>
+    <p:tnLst>
+      <p:par>
+        <p:cTn id="1" dur="indefinite" restart="never" nodeType="tmRoot"/>
+      </p:par>
+    </p:tnLst>
+  </p:timing>
 </p:sld>
 </file>
 
@@ -5105,12 +5563,1015 @@
           <a:p>
             <a:pPr algn="ctr"/>
             <a:r>
-              <a:rPr lang="en-IN" sz="2000" b="1" dirty="0">
+              <a:rPr lang="en-IN" sz="2000" b="1" dirty="0" smtClean="0">
                 <a:solidFill>
                   <a:schemeClr val="bg1"/>
                 </a:solidFill>
               </a:rPr>
-              <a:t>Problem Statement</a:t>
+              <a:t>Solution Overview</a:t>
+            </a:r>
+            <a:endParaRPr lang="en-IN" sz="2000" b="1" dirty="0">
+              <a:solidFill>
+                <a:schemeClr val="bg1"/>
+              </a:solidFill>
+            </a:endParaRPr>
+          </a:p>
+        </p:txBody>
+      </p:sp>
+      <p:sp>
+        <p:nvSpPr>
+          <p:cNvPr id="4" name="TextBox 3"/>
+          <p:cNvSpPr txBox="1"/>
+          <p:nvPr/>
+        </p:nvSpPr>
+        <p:spPr>
+          <a:xfrm>
+            <a:off x="81480" y="463485"/>
+            <a:ext cx="2308634" cy="369332"/>
+          </a:xfrm>
+          <a:prstGeom prst="rect">
+            <a:avLst/>
+          </a:prstGeom>
+          <a:solidFill>
+            <a:schemeClr val="accent1">
+              <a:lumMod val="75000"/>
+            </a:schemeClr>
+          </a:solidFill>
+        </p:spPr>
+        <p:txBody>
+          <a:bodyPr wrap="square" rtlCol="0">
+            <a:spAutoFit/>
+          </a:bodyPr>
+          <a:lstStyle/>
+          <a:p>
+            <a:r>
+              <a:rPr lang="en-US" b="1" dirty="0" smtClean="0">
+                <a:solidFill>
+                  <a:schemeClr val="bg1"/>
+                </a:solidFill>
+              </a:rPr>
+              <a:t>Platform - Easy search</a:t>
+            </a:r>
+            <a:endParaRPr lang="en-US" b="1" dirty="0">
+              <a:solidFill>
+                <a:schemeClr val="bg1"/>
+              </a:solidFill>
+            </a:endParaRPr>
+          </a:p>
+        </p:txBody>
+      </p:sp>
+      <p:sp>
+        <p:nvSpPr>
+          <p:cNvPr id="16" name="Rectangle 15"/>
+          <p:cNvSpPr/>
+          <p:nvPr/>
+        </p:nvSpPr>
+        <p:spPr>
+          <a:xfrm>
+            <a:off x="0" y="1606131"/>
+            <a:ext cx="12192000" cy="5251869"/>
+          </a:xfrm>
+          <a:prstGeom prst="rect">
+            <a:avLst/>
+          </a:prstGeom>
+          <a:ln w="28575"/>
+        </p:spPr>
+        <p:style>
+          <a:lnRef idx="2">
+            <a:schemeClr val="accent5"/>
+          </a:lnRef>
+          <a:fillRef idx="1">
+            <a:schemeClr val="lt1"/>
+          </a:fillRef>
+          <a:effectRef idx="0">
+            <a:schemeClr val="accent5"/>
+          </a:effectRef>
+          <a:fontRef idx="minor">
+            <a:schemeClr val="dk1"/>
+          </a:fontRef>
+        </p:style>
+        <p:txBody>
+          <a:bodyPr rtlCol="0" anchor="ctr"/>
+          <a:lstStyle/>
+          <a:p>
+            <a:r>
+              <a:rPr lang="en-US" dirty="0"/>
+              <a:t> </a:t>
+            </a:r>
+            <a:endParaRPr lang="en-US" dirty="0"/>
+          </a:p>
+        </p:txBody>
+      </p:sp>
+      <p:sp>
+        <p:nvSpPr>
+          <p:cNvPr id="5" name="TextBox 4"/>
+          <p:cNvSpPr txBox="1"/>
+          <p:nvPr/>
+        </p:nvSpPr>
+        <p:spPr>
+          <a:xfrm>
+            <a:off x="178050" y="867467"/>
+            <a:ext cx="12013950" cy="738664"/>
+          </a:xfrm>
+          <a:prstGeom prst="rect">
+            <a:avLst/>
+          </a:prstGeom>
+          <a:noFill/>
+          <a:ln>
+            <a:solidFill>
+              <a:schemeClr val="tx1"/>
+            </a:solidFill>
+            <a:prstDash val="dashDot"/>
+          </a:ln>
+        </p:spPr>
+        <p:txBody>
+          <a:bodyPr wrap="square" rtlCol="0">
+            <a:spAutoFit/>
+          </a:bodyPr>
+          <a:lstStyle/>
+          <a:p>
+            <a:pPr algn="just"/>
+            <a:r>
+              <a:rPr lang="en-US" sz="1400" b="1" dirty="0" smtClean="0">
+                <a:solidFill>
+                  <a:schemeClr val="accent1">
+                    <a:lumMod val="60000"/>
+                    <a:lumOff val="40000"/>
+                  </a:schemeClr>
+                </a:solidFill>
+                <a:hlinkClick r:id="rId3"/>
+              </a:rPr>
+              <a:t>Easy Search</a:t>
+            </a:r>
+            <a:r>
+              <a:rPr lang="en-US" sz="1400" b="1" dirty="0" smtClean="0">
+                <a:solidFill>
+                  <a:schemeClr val="accent1">
+                    <a:lumMod val="60000"/>
+                    <a:lumOff val="40000"/>
+                  </a:schemeClr>
+                </a:solidFill>
+              </a:rPr>
+              <a:t> </a:t>
+            </a:r>
+            <a:r>
+              <a:rPr lang="en-US" sz="1400" b="1" dirty="0" smtClean="0"/>
+              <a:t>Transparency </a:t>
+            </a:r>
+            <a:r>
+              <a:rPr lang="en-US" sz="1400" b="1" dirty="0"/>
+              <a:t>in Coverage (</a:t>
+            </a:r>
+            <a:r>
+              <a:rPr lang="en-US" sz="1400" b="1" dirty="0" err="1"/>
+              <a:t>TiC</a:t>
+            </a:r>
+            <a:r>
+              <a:rPr lang="en-US" sz="1400" b="1" dirty="0"/>
+              <a:t>)</a:t>
+            </a:r>
+            <a:r>
+              <a:rPr lang="en-US" sz="1400" dirty="0"/>
+              <a:t>, </a:t>
+            </a:r>
+            <a:r>
+              <a:rPr lang="en-US" sz="1400" b="1" dirty="0"/>
+              <a:t>Machine-Readable Files (MRF)</a:t>
+            </a:r>
+            <a:r>
+              <a:rPr lang="en-US" sz="1400" dirty="0"/>
+              <a:t>, </a:t>
+            </a:r>
+            <a:r>
+              <a:rPr lang="en-US" sz="1400" b="1" dirty="0"/>
+              <a:t>claims</a:t>
+            </a:r>
+            <a:r>
+              <a:rPr lang="en-US" sz="1400" dirty="0"/>
+              <a:t>, and </a:t>
+            </a:r>
+            <a:r>
+              <a:rPr lang="en-US" sz="1400" b="1" dirty="0"/>
+              <a:t>provider directories</a:t>
+            </a:r>
+            <a:r>
+              <a:rPr lang="en-US" sz="1400" dirty="0"/>
+              <a:t> into a single analytics ecosystem. It delivers real-time </a:t>
+            </a:r>
+            <a:r>
+              <a:rPr lang="en-US" sz="1400" b="1" dirty="0"/>
+              <a:t>rate benchmarking</a:t>
+            </a:r>
+            <a:r>
+              <a:rPr lang="en-US" sz="1400" dirty="0"/>
+              <a:t>, </a:t>
+            </a:r>
+            <a:r>
+              <a:rPr lang="en-US" sz="1400" b="1" dirty="0"/>
+              <a:t>risk scoring</a:t>
+            </a:r>
+            <a:r>
+              <a:rPr lang="en-US" sz="1400" dirty="0"/>
+              <a:t>, and </a:t>
+            </a:r>
+            <a:r>
+              <a:rPr lang="en-US" sz="1400" b="1" dirty="0"/>
+              <a:t>network adequacy insights</a:t>
+            </a:r>
+            <a:r>
+              <a:rPr lang="en-US" sz="1400" dirty="0"/>
+              <a:t> to reduce costs, enhance efficiency, strengthen coverage, and ensure full </a:t>
+            </a:r>
+            <a:r>
+              <a:rPr lang="en-US" sz="1400" b="1" dirty="0"/>
+              <a:t>CMS </a:t>
+            </a:r>
+            <a:r>
+              <a:rPr lang="en-US" sz="1400" b="1" dirty="0" smtClean="0"/>
+              <a:t>compliance</a:t>
+            </a:r>
+            <a:r>
+              <a:rPr lang="en-US" sz="1400" dirty="0" smtClean="0"/>
+              <a:t>-empowering </a:t>
+            </a:r>
+            <a:r>
+              <a:rPr lang="en-US" sz="1400" dirty="0"/>
+              <a:t>payers to make faster, data-driven, and transparent decisions.</a:t>
+            </a:r>
+          </a:p>
+        </p:txBody>
+      </p:sp>
+      <p:cxnSp>
+        <p:nvCxnSpPr>
+          <p:cNvPr id="9" name="Straight Connector 8"/>
+          <p:cNvCxnSpPr/>
+          <p:nvPr/>
+        </p:nvCxnSpPr>
+        <p:spPr>
+          <a:xfrm>
+            <a:off x="6096000" y="1606131"/>
+            <a:ext cx="10563" cy="5251869"/>
+          </a:xfrm>
+          <a:prstGeom prst="line">
+            <a:avLst/>
+          </a:prstGeom>
+          <a:ln w="57150">
+            <a:solidFill>
+              <a:srgbClr val="0070C0"/>
+            </a:solidFill>
+          </a:ln>
+        </p:spPr>
+        <p:style>
+          <a:lnRef idx="1">
+            <a:schemeClr val="dk1"/>
+          </a:lnRef>
+          <a:fillRef idx="0">
+            <a:schemeClr val="dk1"/>
+          </a:fillRef>
+          <a:effectRef idx="0">
+            <a:schemeClr val="dk1"/>
+          </a:effectRef>
+          <a:fontRef idx="minor">
+            <a:schemeClr val="tx1"/>
+          </a:fontRef>
+        </p:style>
+      </p:cxnSp>
+      <p:cxnSp>
+        <p:nvCxnSpPr>
+          <p:cNvPr id="12" name="Straight Connector 11"/>
+          <p:cNvCxnSpPr/>
+          <p:nvPr/>
+        </p:nvCxnSpPr>
+        <p:spPr>
+          <a:xfrm flipH="1">
+            <a:off x="10563" y="3983524"/>
+            <a:ext cx="12192000" cy="70166"/>
+          </a:xfrm>
+          <a:prstGeom prst="line">
+            <a:avLst/>
+          </a:prstGeom>
+          <a:ln w="57150">
+            <a:solidFill>
+              <a:srgbClr val="0070C0"/>
+            </a:solidFill>
+          </a:ln>
+        </p:spPr>
+        <p:style>
+          <a:lnRef idx="1">
+            <a:schemeClr val="accent1"/>
+          </a:lnRef>
+          <a:fillRef idx="0">
+            <a:schemeClr val="accent1"/>
+          </a:fillRef>
+          <a:effectRef idx="0">
+            <a:schemeClr val="accent1"/>
+          </a:effectRef>
+          <a:fontRef idx="minor">
+            <a:schemeClr val="tx1"/>
+          </a:fontRef>
+        </p:style>
+      </p:cxnSp>
+      <p:pic>
+        <p:nvPicPr>
+          <p:cNvPr id="15" name="Picture 14"/>
+          <p:cNvPicPr>
+            <a:picLocks noChangeAspect="1"/>
+          </p:cNvPicPr>
+          <p:nvPr/>
+        </p:nvPicPr>
+        <p:blipFill rotWithShape="1">
+          <a:blip r:embed="rId4"/>
+          <a:srcRect l="16402" t="11908" r="17224" b="10961"/>
+          <a:stretch/>
+        </p:blipFill>
+        <p:spPr>
+          <a:xfrm>
+            <a:off x="246630" y="1699180"/>
+            <a:ext cx="2657820" cy="1737337"/>
+          </a:xfrm>
+          <a:prstGeom prst="roundRect">
+            <a:avLst>
+              <a:gd name="adj" fmla="val 4167"/>
+            </a:avLst>
+          </a:prstGeom>
+          <a:solidFill>
+            <a:srgbClr val="FFFFFF"/>
+          </a:solidFill>
+          <a:ln w="76200" cap="sq">
+            <a:solidFill>
+              <a:srgbClr val="292929"/>
+            </a:solidFill>
+            <a:miter lim="800000"/>
+          </a:ln>
+          <a:effectLst>
+            <a:reflection blurRad="12700" stA="28000" endPos="28000" dist="5000" dir="5400000" sy="-100000" algn="bl" rotWithShape="0"/>
+          </a:effectLst>
+          <a:scene3d>
+            <a:camera prst="orthographicFront"/>
+            <a:lightRig rig="threePt" dir="t">
+              <a:rot lat="0" lon="0" rev="2700000"/>
+            </a:lightRig>
+          </a:scene3d>
+          <a:sp3d>
+            <a:bevelT h="38100"/>
+            <a:contourClr>
+              <a:srgbClr val="C0C0C0"/>
+            </a:contourClr>
+          </a:sp3d>
+        </p:spPr>
+      </p:pic>
+      <p:sp>
+        <p:nvSpPr>
+          <p:cNvPr id="17" name="TextBox 16"/>
+          <p:cNvSpPr txBox="1"/>
+          <p:nvPr/>
+        </p:nvSpPr>
+        <p:spPr>
+          <a:xfrm>
+            <a:off x="246630" y="3675747"/>
+            <a:ext cx="2657820" cy="307777"/>
+          </a:xfrm>
+          <a:prstGeom prst="rect">
+            <a:avLst/>
+          </a:prstGeom>
+          <a:solidFill>
+            <a:schemeClr val="accent1">
+              <a:lumMod val="75000"/>
+            </a:schemeClr>
+          </a:solidFill>
+        </p:spPr>
+        <p:txBody>
+          <a:bodyPr wrap="square" rtlCol="0">
+            <a:spAutoFit/>
+          </a:bodyPr>
+          <a:lstStyle/>
+          <a:p>
+            <a:pPr algn="ctr"/>
+            <a:r>
+              <a:rPr lang="en-US" sz="1400" b="1" dirty="0" smtClean="0">
+                <a:solidFill>
+                  <a:schemeClr val="bg1"/>
+                </a:solidFill>
+              </a:rPr>
+              <a:t>Network Executive Dashboard</a:t>
+            </a:r>
+            <a:endParaRPr lang="en-US" sz="1400" b="1" dirty="0">
+              <a:solidFill>
+                <a:schemeClr val="bg1"/>
+              </a:solidFill>
+            </a:endParaRPr>
+          </a:p>
+        </p:txBody>
+      </p:sp>
+      <p:sp>
+        <p:nvSpPr>
+          <p:cNvPr id="18" name="TextBox 17"/>
+          <p:cNvSpPr txBox="1"/>
+          <p:nvPr/>
+        </p:nvSpPr>
+        <p:spPr>
+          <a:xfrm>
+            <a:off x="2983769" y="1640665"/>
+            <a:ext cx="3032911" cy="2123658"/>
+          </a:xfrm>
+          <a:prstGeom prst="rect">
+            <a:avLst/>
+          </a:prstGeom>
+          <a:noFill/>
+        </p:spPr>
+        <p:txBody>
+          <a:bodyPr wrap="square" rtlCol="0">
+            <a:spAutoFit/>
+          </a:bodyPr>
+          <a:lstStyle/>
+          <a:p>
+            <a:pPr marL="171450" indent="-171450">
+              <a:buFont typeface="Arial" panose="020B0604020202020204" pitchFamily="34" charset="0"/>
+              <a:buChar char="•"/>
+            </a:pPr>
+            <a:r>
+              <a:rPr lang="en-US" sz="1200" b="1" dirty="0"/>
+              <a:t>Executive KPI Summary Cards </a:t>
+            </a:r>
+            <a:r>
+              <a:rPr lang="en-US" sz="1200" dirty="0" smtClean="0"/>
+              <a:t>: Average </a:t>
+            </a:r>
+            <a:r>
+              <a:rPr lang="en-US" sz="1200" dirty="0"/>
+              <a:t>Rate vs Market, PMPM </a:t>
+            </a:r>
+            <a:r>
+              <a:rPr lang="en-US" sz="1200" dirty="0" smtClean="0"/>
+              <a:t>Cost, etc.</a:t>
+            </a:r>
+          </a:p>
+          <a:p>
+            <a:endParaRPr lang="en-US" sz="1200" dirty="0"/>
+          </a:p>
+          <a:p>
+            <a:pPr marL="171450" indent="-171450">
+              <a:buFont typeface="Arial" panose="020B0604020202020204" pitchFamily="34" charset="0"/>
+              <a:buChar char="•"/>
+            </a:pPr>
+            <a:r>
+              <a:rPr lang="en-US" sz="1200" b="1" dirty="0" smtClean="0"/>
+              <a:t>Global Filters Panel :</a:t>
+            </a:r>
+          </a:p>
+          <a:p>
+            <a:r>
+              <a:rPr lang="en-US" sz="1200" dirty="0" smtClean="0"/>
+              <a:t>     analytics by Region, Specialty, Plan Type</a:t>
+            </a:r>
+          </a:p>
+          <a:p>
+            <a:endParaRPr lang="en-US" sz="1200" b="1" dirty="0"/>
+          </a:p>
+          <a:p>
+            <a:pPr marL="171450" indent="-171450">
+              <a:buFont typeface="Arial" panose="020B0604020202020204" pitchFamily="34" charset="0"/>
+              <a:buChar char="•"/>
+            </a:pPr>
+            <a:r>
+              <a:rPr lang="en-US" sz="1200" b="1" dirty="0"/>
+              <a:t>Cost Variance </a:t>
+            </a:r>
+            <a:r>
+              <a:rPr lang="en-US" sz="1200" b="1" dirty="0" err="1" smtClean="0"/>
+              <a:t>Heatmap</a:t>
+            </a:r>
+            <a:r>
+              <a:rPr lang="en-US" sz="1200" b="1" dirty="0" smtClean="0"/>
+              <a:t> :</a:t>
+            </a:r>
+            <a:r>
+              <a:rPr lang="en-US" sz="1200" dirty="0" smtClean="0"/>
+              <a:t> identify </a:t>
+            </a:r>
+            <a:r>
+              <a:rPr lang="en-US" sz="1200" dirty="0"/>
+              <a:t>regional overspend and target negotiation zones</a:t>
+            </a:r>
+            <a:r>
+              <a:rPr lang="en-US" sz="1200" dirty="0" smtClean="0"/>
+              <a:t>.</a:t>
+            </a:r>
+          </a:p>
+          <a:p>
+            <a:pPr marL="171450" indent="-171450">
+              <a:buFont typeface="Arial" panose="020B0604020202020204" pitchFamily="34" charset="0"/>
+              <a:buChar char="•"/>
+            </a:pPr>
+            <a:endParaRPr lang="en-US" sz="1200" dirty="0"/>
+          </a:p>
+          <a:p>
+            <a:pPr marL="171450" indent="-171450">
+              <a:buFont typeface="Arial" panose="020B0604020202020204" pitchFamily="34" charset="0"/>
+              <a:buChar char="•"/>
+            </a:pPr>
+            <a:r>
+              <a:rPr lang="en-US" sz="1200" dirty="0"/>
+              <a:t>Rate Comparison by Specialty (Main </a:t>
+            </a:r>
+            <a:r>
+              <a:rPr lang="en-US" sz="1200" b="1" dirty="0"/>
+              <a:t>Histogram</a:t>
+            </a:r>
+            <a:r>
+              <a:rPr lang="en-US" sz="1200" dirty="0" smtClean="0"/>
+              <a:t>): provide good intuition</a:t>
+            </a:r>
+            <a:endParaRPr lang="en-US" sz="1200" dirty="0"/>
+          </a:p>
+        </p:txBody>
+      </p:sp>
+      <p:pic>
+        <p:nvPicPr>
+          <p:cNvPr id="19" name="Picture 18"/>
+          <p:cNvPicPr>
+            <a:picLocks noChangeAspect="1"/>
+          </p:cNvPicPr>
+          <p:nvPr/>
+        </p:nvPicPr>
+        <p:blipFill rotWithShape="1">
+          <a:blip r:embed="rId5"/>
+          <a:srcRect l="8475" t="6866" r="10594" b="17196"/>
+          <a:stretch/>
+        </p:blipFill>
+        <p:spPr>
+          <a:xfrm>
+            <a:off x="6185991" y="1699180"/>
+            <a:ext cx="3112122" cy="1651379"/>
+          </a:xfrm>
+          <a:prstGeom prst="roundRect">
+            <a:avLst>
+              <a:gd name="adj" fmla="val 4167"/>
+            </a:avLst>
+          </a:prstGeom>
+          <a:solidFill>
+            <a:srgbClr val="FFFFFF"/>
+          </a:solidFill>
+          <a:ln w="76200" cap="sq">
+            <a:solidFill>
+              <a:srgbClr val="292929"/>
+            </a:solidFill>
+            <a:miter lim="800000"/>
+          </a:ln>
+          <a:effectLst>
+            <a:reflection blurRad="12700" stA="28000" endPos="28000" dist="5000" dir="5400000" sy="-100000" algn="bl" rotWithShape="0"/>
+          </a:effectLst>
+          <a:scene3d>
+            <a:camera prst="orthographicFront"/>
+            <a:lightRig rig="threePt" dir="t">
+              <a:rot lat="0" lon="0" rev="2700000"/>
+            </a:lightRig>
+          </a:scene3d>
+          <a:sp3d>
+            <a:bevelT h="38100"/>
+            <a:contourClr>
+              <a:srgbClr val="C0C0C0"/>
+            </a:contourClr>
+          </a:sp3d>
+        </p:spPr>
+      </p:pic>
+      <p:sp>
+        <p:nvSpPr>
+          <p:cNvPr id="20" name="TextBox 19"/>
+          <p:cNvSpPr txBox="1"/>
+          <p:nvPr/>
+        </p:nvSpPr>
+        <p:spPr>
+          <a:xfrm>
+            <a:off x="6342628" y="3646707"/>
+            <a:ext cx="2865601" cy="307777"/>
+          </a:xfrm>
+          <a:prstGeom prst="rect">
+            <a:avLst/>
+          </a:prstGeom>
+          <a:solidFill>
+            <a:schemeClr val="accent1">
+              <a:lumMod val="75000"/>
+            </a:schemeClr>
+          </a:solidFill>
+        </p:spPr>
+        <p:txBody>
+          <a:bodyPr wrap="square" rtlCol="0">
+            <a:spAutoFit/>
+          </a:bodyPr>
+          <a:lstStyle/>
+          <a:p>
+            <a:pPr algn="ctr"/>
+            <a:r>
+              <a:rPr lang="en-US" sz="1400" b="1" dirty="0" smtClean="0">
+                <a:solidFill>
+                  <a:schemeClr val="bg1"/>
+                </a:solidFill>
+              </a:rPr>
+              <a:t>Network Manager Dashboard</a:t>
+            </a:r>
+            <a:endParaRPr lang="en-US" sz="1400" b="1" dirty="0">
+              <a:solidFill>
+                <a:schemeClr val="bg1"/>
+              </a:solidFill>
+            </a:endParaRPr>
+          </a:p>
+        </p:txBody>
+      </p:sp>
+      <p:sp>
+        <p:nvSpPr>
+          <p:cNvPr id="22" name="TextBox 21"/>
+          <p:cNvSpPr txBox="1"/>
+          <p:nvPr/>
+        </p:nvSpPr>
+        <p:spPr>
+          <a:xfrm>
+            <a:off x="9298113" y="1606131"/>
+            <a:ext cx="2893887" cy="2492990"/>
+          </a:xfrm>
+          <a:prstGeom prst="rect">
+            <a:avLst/>
+          </a:prstGeom>
+          <a:noFill/>
+        </p:spPr>
+        <p:txBody>
+          <a:bodyPr wrap="square" rtlCol="0">
+            <a:spAutoFit/>
+          </a:bodyPr>
+          <a:lstStyle/>
+          <a:p>
+            <a:pPr marL="171450" indent="-171450">
+              <a:buFont typeface="Arial" panose="020B0604020202020204" pitchFamily="34" charset="0"/>
+              <a:buChar char="•"/>
+            </a:pPr>
+            <a:r>
+              <a:rPr lang="en-US" sz="1200" b="1" dirty="0"/>
+              <a:t>Key Operational </a:t>
+            </a:r>
+            <a:r>
+              <a:rPr lang="en-US" sz="1200" b="1" dirty="0" smtClean="0"/>
+              <a:t>Cards </a:t>
+            </a:r>
+            <a:r>
+              <a:rPr lang="en-US" sz="1200" dirty="0" smtClean="0"/>
+              <a:t>: Contracts </a:t>
+            </a:r>
+            <a:r>
+              <a:rPr lang="en-US" sz="1200" dirty="0"/>
+              <a:t>Near Renewal, Regions </a:t>
+            </a:r>
+            <a:r>
+              <a:rPr lang="en-US" sz="1200" dirty="0" smtClean="0"/>
+              <a:t>Below adequacy</a:t>
+            </a:r>
+          </a:p>
+          <a:p>
+            <a:pPr marL="171450" indent="-171450">
+              <a:buFont typeface="Arial" panose="020B0604020202020204" pitchFamily="34" charset="0"/>
+              <a:buChar char="•"/>
+            </a:pPr>
+            <a:endParaRPr lang="en-US" sz="1200" dirty="0"/>
+          </a:p>
+          <a:p>
+            <a:pPr marL="171450" indent="-171450">
+              <a:buFont typeface="Arial" panose="020B0604020202020204" pitchFamily="34" charset="0"/>
+              <a:buChar char="•"/>
+            </a:pPr>
+            <a:r>
+              <a:rPr lang="en-US" sz="1200" b="1" dirty="0"/>
+              <a:t>Coverage Gap </a:t>
+            </a:r>
+            <a:r>
+              <a:rPr lang="en-US" sz="1200" b="1" dirty="0" smtClean="0"/>
+              <a:t>Alert : </a:t>
+            </a:r>
+            <a:r>
+              <a:rPr lang="en-US" sz="1200" dirty="0"/>
+              <a:t>real-time adequacy gap </a:t>
+            </a:r>
+            <a:r>
+              <a:rPr lang="en-US" sz="1200" dirty="0" smtClean="0"/>
+              <a:t>notifications</a:t>
+            </a:r>
+          </a:p>
+          <a:p>
+            <a:pPr marL="171450" indent="-171450">
+              <a:buFont typeface="Arial" panose="020B0604020202020204" pitchFamily="34" charset="0"/>
+              <a:buChar char="•"/>
+            </a:pPr>
+            <a:endParaRPr lang="en-US" sz="1200" dirty="0"/>
+          </a:p>
+          <a:p>
+            <a:pPr marL="171450" indent="-171450">
+              <a:buFont typeface="Arial" panose="020B0604020202020204" pitchFamily="34" charset="0"/>
+              <a:buChar char="•"/>
+            </a:pPr>
+            <a:r>
+              <a:rPr lang="en-US" sz="1200" b="1" dirty="0"/>
+              <a:t>Dynamic Adequacy </a:t>
+            </a:r>
+            <a:r>
+              <a:rPr lang="en-US" sz="1200" b="1" dirty="0" err="1" smtClean="0"/>
+              <a:t>Heatmap</a:t>
+            </a:r>
+            <a:r>
+              <a:rPr lang="en-US" sz="1200" b="1" dirty="0" smtClean="0"/>
+              <a:t> : </a:t>
+            </a:r>
+            <a:r>
+              <a:rPr lang="en-US" sz="1200" dirty="0"/>
+              <a:t>help managers pinpoint weak zones quickly</a:t>
+            </a:r>
+            <a:r>
+              <a:rPr lang="en-US" sz="1200" dirty="0" smtClean="0"/>
+              <a:t>.</a:t>
+            </a:r>
+          </a:p>
+          <a:p>
+            <a:pPr marL="171450" indent="-171450">
+              <a:buFont typeface="Arial" panose="020B0604020202020204" pitchFamily="34" charset="0"/>
+              <a:buChar char="•"/>
+            </a:pPr>
+            <a:endParaRPr lang="en-US" sz="1200" dirty="0"/>
+          </a:p>
+          <a:p>
+            <a:pPr marL="171450" indent="-171450">
+              <a:buFont typeface="Arial" panose="020B0604020202020204" pitchFamily="34" charset="0"/>
+              <a:buChar char="•"/>
+            </a:pPr>
+            <a:r>
+              <a:rPr lang="en-US" sz="1200" b="1" dirty="0"/>
+              <a:t>Executive Sync &amp; Reporting </a:t>
+            </a:r>
+            <a:r>
+              <a:rPr lang="en-US" sz="1200" b="1" dirty="0" smtClean="0"/>
+              <a:t>Tools : </a:t>
+            </a:r>
+            <a:r>
+              <a:rPr lang="en-US" sz="1200" dirty="0"/>
+              <a:t>alignment between strategic </a:t>
+            </a:r>
+            <a:r>
+              <a:rPr lang="en-US" sz="1200" dirty="0" smtClean="0"/>
+              <a:t>(executive</a:t>
+            </a:r>
+            <a:r>
+              <a:rPr lang="en-US" sz="1200" dirty="0"/>
+              <a:t>) and operational (manager) views.</a:t>
+            </a:r>
+            <a:r>
+              <a:rPr lang="en-US" sz="1200" b="1" dirty="0" smtClean="0"/>
+              <a:t/>
+            </a:r>
+            <a:br>
+              <a:rPr lang="en-US" sz="1200" b="1" dirty="0" smtClean="0"/>
+            </a:br>
+            <a:endParaRPr lang="en-US" sz="1200" b="1" dirty="0"/>
+          </a:p>
+        </p:txBody>
+      </p:sp>
+      <p:pic>
+        <p:nvPicPr>
+          <p:cNvPr id="23" name="Picture 22"/>
+          <p:cNvPicPr>
+            <a:picLocks noChangeAspect="1"/>
+          </p:cNvPicPr>
+          <p:nvPr/>
+        </p:nvPicPr>
+        <p:blipFill rotWithShape="1">
+          <a:blip r:embed="rId6"/>
+          <a:srcRect l="10705" t="11771" r="13788" b="11306"/>
+          <a:stretch/>
+        </p:blipFill>
+        <p:spPr>
+          <a:xfrm>
+            <a:off x="178050" y="4209831"/>
+            <a:ext cx="3304515" cy="1893669"/>
+          </a:xfrm>
+          <a:prstGeom prst="roundRect">
+            <a:avLst>
+              <a:gd name="adj" fmla="val 4167"/>
+            </a:avLst>
+          </a:prstGeom>
+          <a:solidFill>
+            <a:srgbClr val="FFFFFF"/>
+          </a:solidFill>
+          <a:ln w="76200" cap="sq">
+            <a:solidFill>
+              <a:srgbClr val="292929"/>
+            </a:solidFill>
+            <a:miter lim="800000"/>
+          </a:ln>
+          <a:effectLst>
+            <a:reflection blurRad="12700" stA="28000" endPos="28000" dist="5000" dir="5400000" sy="-100000" algn="bl" rotWithShape="0"/>
+          </a:effectLst>
+          <a:scene3d>
+            <a:camera prst="orthographicFront"/>
+            <a:lightRig rig="threePt" dir="t">
+              <a:rot lat="0" lon="0" rev="2700000"/>
+            </a:lightRig>
+          </a:scene3d>
+          <a:sp3d>
+            <a:bevelT h="38100"/>
+            <a:contourClr>
+              <a:srgbClr val="C0C0C0"/>
+            </a:contourClr>
+          </a:sp3d>
+        </p:spPr>
+      </p:pic>
+      <p:sp>
+        <p:nvSpPr>
+          <p:cNvPr id="24" name="TextBox 23"/>
+          <p:cNvSpPr txBox="1"/>
+          <p:nvPr/>
+        </p:nvSpPr>
+        <p:spPr>
+          <a:xfrm>
+            <a:off x="349880" y="6431418"/>
+            <a:ext cx="2959602" cy="307777"/>
+          </a:xfrm>
+          <a:prstGeom prst="rect">
+            <a:avLst/>
+          </a:prstGeom>
+          <a:solidFill>
+            <a:schemeClr val="accent1">
+              <a:lumMod val="75000"/>
+            </a:schemeClr>
+          </a:solidFill>
+        </p:spPr>
+        <p:txBody>
+          <a:bodyPr wrap="square" rtlCol="0">
+            <a:spAutoFit/>
+          </a:bodyPr>
+          <a:lstStyle/>
+          <a:p>
+            <a:pPr algn="ctr"/>
+            <a:r>
+              <a:rPr lang="en-US" sz="1400" b="1" dirty="0" smtClean="0">
+                <a:solidFill>
+                  <a:schemeClr val="bg1"/>
+                </a:solidFill>
+              </a:rPr>
+              <a:t>Contracting Team Dashboard</a:t>
+            </a:r>
+            <a:endParaRPr lang="en-US" sz="1400" b="1" dirty="0">
+              <a:solidFill>
+                <a:schemeClr val="bg1"/>
+              </a:solidFill>
+            </a:endParaRPr>
+          </a:p>
+        </p:txBody>
+      </p:sp>
+      <p:sp>
+        <p:nvSpPr>
+          <p:cNvPr id="25" name="TextBox 24"/>
+          <p:cNvSpPr txBox="1"/>
+          <p:nvPr/>
+        </p:nvSpPr>
+        <p:spPr>
+          <a:xfrm>
+            <a:off x="3569976" y="4018607"/>
+            <a:ext cx="2536587" cy="2862322"/>
+          </a:xfrm>
+          <a:prstGeom prst="rect">
+            <a:avLst/>
+          </a:prstGeom>
+          <a:noFill/>
+        </p:spPr>
+        <p:txBody>
+          <a:bodyPr wrap="square" rtlCol="0">
+            <a:spAutoFit/>
+          </a:bodyPr>
+          <a:lstStyle/>
+          <a:p>
+            <a:pPr marL="171450" indent="-171450">
+              <a:buFont typeface="Arial" panose="020B0604020202020204" pitchFamily="34" charset="0"/>
+              <a:buChar char="•"/>
+            </a:pPr>
+            <a:r>
+              <a:rPr lang="en-US" sz="1200" b="1" dirty="0"/>
+              <a:t>Contracting Intelligence </a:t>
+            </a:r>
+            <a:r>
+              <a:rPr lang="en-US" sz="1200" b="1" dirty="0" smtClean="0"/>
+              <a:t>Overview:</a:t>
+            </a:r>
+          </a:p>
+          <a:p>
+            <a:r>
+              <a:rPr lang="en-US" sz="1200" b="1" dirty="0" smtClean="0"/>
+              <a:t>      </a:t>
+            </a:r>
+            <a:r>
+              <a:rPr lang="en-US" sz="1200" dirty="0"/>
+              <a:t>Displays Contracts </a:t>
+            </a:r>
+            <a:r>
+              <a:rPr lang="en-US" sz="1200" dirty="0" smtClean="0"/>
+              <a:t>up for renewal, </a:t>
+            </a:r>
+            <a:br>
+              <a:rPr lang="en-US" sz="1200" dirty="0" smtClean="0"/>
+            </a:br>
+            <a:r>
+              <a:rPr lang="en-US" sz="1200" dirty="0" smtClean="0"/>
+              <a:t>      average negotiation leverage.</a:t>
+            </a:r>
+          </a:p>
+          <a:p>
+            <a:endParaRPr lang="en-US" sz="1200" dirty="0"/>
+          </a:p>
+          <a:p>
+            <a:pPr marL="171450" indent="-171450">
+              <a:buFont typeface="Arial" panose="020B0604020202020204" pitchFamily="34" charset="0"/>
+              <a:buChar char="•"/>
+            </a:pPr>
+            <a:r>
+              <a:rPr lang="en-US" sz="1200" b="1" dirty="0"/>
+              <a:t>Real-Time </a:t>
+            </a:r>
+            <a:r>
+              <a:rPr lang="en-US" sz="1200" b="1" dirty="0" smtClean="0"/>
+              <a:t>Sync &amp; aligned flow:</a:t>
+            </a:r>
+          </a:p>
+          <a:p>
+            <a:r>
+              <a:rPr lang="en-US" sz="1200" b="1" dirty="0"/>
+              <a:t> </a:t>
+            </a:r>
+            <a:r>
+              <a:rPr lang="en-US" sz="1200" b="1" dirty="0" smtClean="0"/>
+              <a:t>    </a:t>
+            </a:r>
+            <a:r>
+              <a:rPr lang="en-US" sz="1200" dirty="0"/>
+              <a:t>New Assignments from </a:t>
+            </a:r>
+            <a:r>
+              <a:rPr lang="en-US" sz="1200" dirty="0" smtClean="0"/>
+              <a:t>Network</a:t>
+            </a:r>
+            <a:br>
+              <a:rPr lang="en-US" sz="1200" dirty="0" smtClean="0"/>
+            </a:br>
+            <a:r>
+              <a:rPr lang="en-US" sz="1200" dirty="0" smtClean="0"/>
+              <a:t>     manager</a:t>
+            </a:r>
+          </a:p>
+          <a:p>
+            <a:endParaRPr lang="en-US" sz="1200" b="1" dirty="0"/>
+          </a:p>
+          <a:p>
+            <a:pPr marL="171450" indent="-171450">
+              <a:buFont typeface="Arial" panose="020B0604020202020204" pitchFamily="34" charset="0"/>
+              <a:buChar char="•"/>
+            </a:pPr>
+            <a:r>
+              <a:rPr lang="en-US" sz="1200" b="1" dirty="0"/>
+              <a:t>Rate Benchmarking </a:t>
+            </a:r>
+            <a:r>
+              <a:rPr lang="en-US" sz="1200" b="1" dirty="0" smtClean="0"/>
+              <a:t>Table </a:t>
+            </a:r>
+            <a:r>
+              <a:rPr lang="en-US" sz="1200" b="1" dirty="0"/>
+              <a:t>: </a:t>
+            </a:r>
+            <a:r>
+              <a:rPr lang="en-US" sz="1200" dirty="0"/>
+              <a:t>multi-level contract benchmarking by provider, specialty, and CPT code</a:t>
+            </a:r>
+            <a:r>
+              <a:rPr lang="en-US" sz="1200" dirty="0" smtClean="0"/>
+              <a:t>.</a:t>
+            </a:r>
+          </a:p>
+          <a:p>
+            <a:pPr marL="171450" indent="-171450">
+              <a:buFont typeface="Arial" panose="020B0604020202020204" pitchFamily="34" charset="0"/>
+              <a:buChar char="•"/>
+            </a:pPr>
+            <a:endParaRPr lang="en-US" sz="1200" b="1" dirty="0"/>
+          </a:p>
+          <a:p>
+            <a:pPr marL="171450" indent="-171450">
+              <a:buFont typeface="Arial" panose="020B0604020202020204" pitchFamily="34" charset="0"/>
+              <a:buChar char="•"/>
+            </a:pPr>
+            <a:r>
+              <a:rPr lang="en-US" sz="1200" b="1" dirty="0"/>
+              <a:t>Export &amp; Reporting </a:t>
+            </a:r>
+            <a:r>
+              <a:rPr lang="en-US" sz="1200" b="1" dirty="0" smtClean="0"/>
+              <a:t>Tools : </a:t>
+            </a:r>
+            <a:r>
+              <a:rPr lang="en-US" sz="1200" dirty="0"/>
+              <a:t>Negotiation Packet (PPT), Rate Analysis (Excel), and PDF Report</a:t>
             </a:r>
           </a:p>
         </p:txBody>
@@ -5125,6 +6586,13 @@
   <p:clrMapOvr>
     <a:masterClrMapping/>
   </p:clrMapOvr>
+  <p:timing>
+    <p:tnLst>
+      <p:par>
+        <p:cTn id="1" dur="indefinite" restart="never" nodeType="tmRoot"/>
+      </p:par>
+    </p:tnLst>
+  </p:timing>
 </p:sld>
 </file>
 
@@ -5193,6 +6661,2604 @@
           </a:p>
         </p:txBody>
       </p:sp>
+      <p:graphicFrame>
+        <p:nvGraphicFramePr>
+          <p:cNvPr id="3" name="Table 2"/>
+          <p:cNvGraphicFramePr>
+            <a:graphicFrameLocks noGrp="1"/>
+          </p:cNvGraphicFramePr>
+          <p:nvPr>
+            <p:extLst>
+              <p:ext uri="{D42A27DB-BD31-4B8C-83A1-F6EECF244321}">
+                <p14:modId xmlns:p14="http://schemas.microsoft.com/office/powerpoint/2010/main" val="687531970"/>
+              </p:ext>
+            </p:extLst>
+          </p:nvPr>
+        </p:nvGraphicFramePr>
+        <p:xfrm>
+          <a:off x="5310681" y="859977"/>
+          <a:ext cx="6881319" cy="5830532"/>
+        </p:xfrm>
+        <a:graphic>
+          <a:graphicData uri="http://schemas.openxmlformats.org/drawingml/2006/table">
+            <a:tbl>
+              <a:tblPr/>
+              <a:tblGrid>
+                <a:gridCol w="2293773">
+                  <a:extLst>
+                    <a:ext uri="{9D8B030D-6E8A-4147-A177-3AD203B41FA5}">
+                      <a16:colId xmlns:a16="http://schemas.microsoft.com/office/drawing/2014/main" val="2467151117"/>
+                    </a:ext>
+                  </a:extLst>
+                </a:gridCol>
+                <a:gridCol w="2293773">
+                  <a:extLst>
+                    <a:ext uri="{9D8B030D-6E8A-4147-A177-3AD203B41FA5}">
+                      <a16:colId xmlns:a16="http://schemas.microsoft.com/office/drawing/2014/main" val="4255057883"/>
+                    </a:ext>
+                  </a:extLst>
+                </a:gridCol>
+                <a:gridCol w="2293773">
+                  <a:extLst>
+                    <a:ext uri="{9D8B030D-6E8A-4147-A177-3AD203B41FA5}">
+                      <a16:colId xmlns:a16="http://schemas.microsoft.com/office/drawing/2014/main" val="821776332"/>
+                    </a:ext>
+                  </a:extLst>
+                </a:gridCol>
+              </a:tblGrid>
+              <a:tr h="314742">
+                <a:tc>
+                  <a:txBody>
+                    <a:bodyPr/>
+                    <a:lstStyle/>
+                    <a:p>
+                      <a:r>
+                        <a:rPr lang="en-US" sz="1400" b="1" dirty="0">
+                          <a:solidFill>
+                            <a:schemeClr val="bg1"/>
+                          </a:solidFill>
+                        </a:rPr>
+                        <a:t>Stage</a:t>
+                      </a:r>
+                      <a:endParaRPr lang="en-US" sz="1400" dirty="0">
+                        <a:solidFill>
+                          <a:schemeClr val="bg1"/>
+                        </a:solidFill>
+                      </a:endParaRPr>
+                    </a:p>
+                  </a:txBody>
+                  <a:tcPr marL="70183" marR="70183" marT="35091" marB="35091" anchor="ctr">
+                    <a:lnL>
+                      <a:noFill/>
+                    </a:lnL>
+                    <a:lnR>
+                      <a:noFill/>
+                    </a:lnR>
+                    <a:lnT>
+                      <a:noFill/>
+                    </a:lnT>
+                    <a:lnB w="12700" cap="flat" cmpd="sng" algn="ctr">
+                      <a:solidFill>
+                        <a:schemeClr val="tx1"/>
+                      </a:solidFill>
+                      <a:prstDash val="solid"/>
+                      <a:round/>
+                      <a:headEnd type="none" w="med" len="med"/>
+                      <a:tailEnd type="none" w="med" len="med"/>
+                    </a:lnB>
+                    <a:solidFill>
+                      <a:schemeClr val="accent1">
+                        <a:lumMod val="75000"/>
+                      </a:schemeClr>
+                    </a:solidFill>
+                  </a:tcPr>
+                </a:tc>
+                <a:tc>
+                  <a:txBody>
+                    <a:bodyPr/>
+                    <a:lstStyle/>
+                    <a:p>
+                      <a:r>
+                        <a:rPr lang="en-US" sz="1400" b="1" dirty="0">
+                          <a:solidFill>
+                            <a:schemeClr val="bg1"/>
+                          </a:solidFill>
+                        </a:rPr>
+                        <a:t>Purpose</a:t>
+                      </a:r>
+                      <a:endParaRPr lang="en-US" sz="1400" dirty="0">
+                        <a:solidFill>
+                          <a:schemeClr val="bg1"/>
+                        </a:solidFill>
+                      </a:endParaRPr>
+                    </a:p>
+                  </a:txBody>
+                  <a:tcPr marL="70183" marR="70183" marT="35091" marB="35091" anchor="ctr">
+                    <a:lnL>
+                      <a:noFill/>
+                    </a:lnL>
+                    <a:lnR>
+                      <a:noFill/>
+                    </a:lnR>
+                    <a:lnT>
+                      <a:noFill/>
+                    </a:lnT>
+                    <a:lnB w="12700" cap="flat" cmpd="sng" algn="ctr">
+                      <a:solidFill>
+                        <a:schemeClr val="tx1"/>
+                      </a:solidFill>
+                      <a:prstDash val="solid"/>
+                      <a:round/>
+                      <a:headEnd type="none" w="med" len="med"/>
+                      <a:tailEnd type="none" w="med" len="med"/>
+                    </a:lnB>
+                    <a:solidFill>
+                      <a:schemeClr val="accent1">
+                        <a:lumMod val="75000"/>
+                      </a:schemeClr>
+                    </a:solidFill>
+                  </a:tcPr>
+                </a:tc>
+                <a:tc>
+                  <a:txBody>
+                    <a:bodyPr/>
+                    <a:lstStyle/>
+                    <a:p>
+                      <a:r>
+                        <a:rPr lang="en-US" sz="1400" b="1" dirty="0">
+                          <a:solidFill>
+                            <a:schemeClr val="bg1"/>
+                          </a:solidFill>
+                        </a:rPr>
+                        <a:t>Core Tech/Tool Examples</a:t>
+                      </a:r>
+                      <a:endParaRPr lang="en-US" sz="1400" dirty="0">
+                        <a:solidFill>
+                          <a:schemeClr val="bg1"/>
+                        </a:solidFill>
+                      </a:endParaRPr>
+                    </a:p>
+                  </a:txBody>
+                  <a:tcPr marL="70183" marR="70183" marT="35091" marB="35091" anchor="ctr">
+                    <a:lnL>
+                      <a:noFill/>
+                    </a:lnL>
+                    <a:lnR>
+                      <a:noFill/>
+                    </a:lnR>
+                    <a:lnT>
+                      <a:noFill/>
+                    </a:lnT>
+                    <a:lnB w="12700" cap="flat" cmpd="sng" algn="ctr">
+                      <a:solidFill>
+                        <a:schemeClr val="tx1"/>
+                      </a:solidFill>
+                      <a:prstDash val="solid"/>
+                      <a:round/>
+                      <a:headEnd type="none" w="med" len="med"/>
+                      <a:tailEnd type="none" w="med" len="med"/>
+                    </a:lnB>
+                    <a:solidFill>
+                      <a:schemeClr val="accent1">
+                        <a:lumMod val="75000"/>
+                      </a:schemeClr>
+                    </a:solidFill>
+                  </a:tcPr>
+                </a:tc>
+                <a:extLst>
+                  <a:ext uri="{0D108BD9-81ED-4DB2-BD59-A6C34878D82A}">
+                    <a16:rowId xmlns:a16="http://schemas.microsoft.com/office/drawing/2014/main" val="1424086096"/>
+                  </a:ext>
+                </a:extLst>
+              </a:tr>
+              <a:tr h="551579">
+                <a:tc>
+                  <a:txBody>
+                    <a:bodyPr/>
+                    <a:lstStyle/>
+                    <a:p>
+                      <a:r>
+                        <a:rPr lang="en-US" sz="1400" b="1" dirty="0"/>
+                        <a:t>1. Ingestion</a:t>
+                      </a:r>
+                      <a:endParaRPr lang="en-US" sz="1400" dirty="0"/>
+                    </a:p>
+                  </a:txBody>
+                  <a:tcPr marL="70183" marR="70183" marT="35091" marB="35091" anchor="ctr">
+                    <a:lnL w="12700" cap="flat" cmpd="sng" algn="ctr">
+                      <a:solidFill>
+                        <a:schemeClr val="tx1"/>
+                      </a:solidFill>
+                      <a:prstDash val="solid"/>
+                      <a:round/>
+                      <a:headEnd type="none" w="med" len="med"/>
+                      <a:tailEnd type="none" w="med" len="med"/>
+                    </a:lnL>
+                    <a:lnR w="12700" cap="flat" cmpd="sng" algn="ctr">
+                      <a:solidFill>
+                        <a:schemeClr val="tx1"/>
+                      </a:solidFill>
+                      <a:prstDash val="solid"/>
+                      <a:round/>
+                      <a:headEnd type="none" w="med" len="med"/>
+                      <a:tailEnd type="none" w="med" len="med"/>
+                    </a:lnR>
+                    <a:lnT w="12700" cap="flat" cmpd="sng" algn="ctr">
+                      <a:solidFill>
+                        <a:schemeClr val="tx1"/>
+                      </a:solidFill>
+                      <a:prstDash val="solid"/>
+                      <a:round/>
+                      <a:headEnd type="none" w="med" len="med"/>
+                      <a:tailEnd type="none" w="med" len="med"/>
+                    </a:lnT>
+                    <a:lnB w="12700" cap="flat" cmpd="sng" algn="ctr">
+                      <a:solidFill>
+                        <a:schemeClr val="tx1"/>
+                      </a:solidFill>
+                      <a:prstDash val="solid"/>
+                      <a:round/>
+                      <a:headEnd type="none" w="med" len="med"/>
+                      <a:tailEnd type="none" w="med" len="med"/>
+                    </a:lnB>
+                  </a:tcPr>
+                </a:tc>
+                <a:tc>
+                  <a:txBody>
+                    <a:bodyPr/>
+                    <a:lstStyle/>
+                    <a:p>
+                      <a:r>
+                        <a:rPr lang="en-US" sz="1400" dirty="0"/>
+                        <a:t>Fetch all source files &amp; APIs automatically</a:t>
+                      </a:r>
+                    </a:p>
+                  </a:txBody>
+                  <a:tcPr marL="70183" marR="70183" marT="35091" marB="35091" anchor="ctr">
+                    <a:lnL w="12700" cap="flat" cmpd="sng" algn="ctr">
+                      <a:solidFill>
+                        <a:schemeClr val="tx1"/>
+                      </a:solidFill>
+                      <a:prstDash val="solid"/>
+                      <a:round/>
+                      <a:headEnd type="none" w="med" len="med"/>
+                      <a:tailEnd type="none" w="med" len="med"/>
+                    </a:lnL>
+                    <a:lnR w="12700" cap="flat" cmpd="sng" algn="ctr">
+                      <a:solidFill>
+                        <a:schemeClr val="tx1"/>
+                      </a:solidFill>
+                      <a:prstDash val="solid"/>
+                      <a:round/>
+                      <a:headEnd type="none" w="med" len="med"/>
+                      <a:tailEnd type="none" w="med" len="med"/>
+                    </a:lnR>
+                    <a:lnT w="12700" cap="flat" cmpd="sng" algn="ctr">
+                      <a:solidFill>
+                        <a:schemeClr val="tx1"/>
+                      </a:solidFill>
+                      <a:prstDash val="solid"/>
+                      <a:round/>
+                      <a:headEnd type="none" w="med" len="med"/>
+                      <a:tailEnd type="none" w="med" len="med"/>
+                    </a:lnT>
+                    <a:lnB w="12700" cap="flat" cmpd="sng" algn="ctr">
+                      <a:solidFill>
+                        <a:schemeClr val="tx1"/>
+                      </a:solidFill>
+                      <a:prstDash val="solid"/>
+                      <a:round/>
+                      <a:headEnd type="none" w="med" len="med"/>
+                      <a:tailEnd type="none" w="med" len="med"/>
+                    </a:lnB>
+                  </a:tcPr>
+                </a:tc>
+                <a:tc>
+                  <a:txBody>
+                    <a:bodyPr/>
+                    <a:lstStyle/>
+                    <a:p>
+                      <a:r>
+                        <a:rPr lang="en-US" sz="1400" dirty="0"/>
+                        <a:t>Airflow, AWS Lambda, Google Cloud Functions</a:t>
+                      </a:r>
+                    </a:p>
+                  </a:txBody>
+                  <a:tcPr marL="70183" marR="70183" marT="35091" marB="35091" anchor="ctr">
+                    <a:lnL w="12700" cap="flat" cmpd="sng" algn="ctr">
+                      <a:solidFill>
+                        <a:schemeClr val="tx1"/>
+                      </a:solidFill>
+                      <a:prstDash val="solid"/>
+                      <a:round/>
+                      <a:headEnd type="none" w="med" len="med"/>
+                      <a:tailEnd type="none" w="med" len="med"/>
+                    </a:lnL>
+                    <a:lnR w="12700" cap="flat" cmpd="sng" algn="ctr">
+                      <a:solidFill>
+                        <a:schemeClr val="tx1"/>
+                      </a:solidFill>
+                      <a:prstDash val="solid"/>
+                      <a:round/>
+                      <a:headEnd type="none" w="med" len="med"/>
+                      <a:tailEnd type="none" w="med" len="med"/>
+                    </a:lnR>
+                    <a:lnT w="12700" cap="flat" cmpd="sng" algn="ctr">
+                      <a:solidFill>
+                        <a:schemeClr val="tx1"/>
+                      </a:solidFill>
+                      <a:prstDash val="solid"/>
+                      <a:round/>
+                      <a:headEnd type="none" w="med" len="med"/>
+                      <a:tailEnd type="none" w="med" len="med"/>
+                    </a:lnT>
+                    <a:lnB w="12700" cap="flat" cmpd="sng" algn="ctr">
+                      <a:solidFill>
+                        <a:schemeClr val="tx1"/>
+                      </a:solidFill>
+                      <a:prstDash val="solid"/>
+                      <a:round/>
+                      <a:headEnd type="none" w="med" len="med"/>
+                      <a:tailEnd type="none" w="med" len="med"/>
+                    </a:lnB>
+                  </a:tcPr>
+                </a:tc>
+                <a:extLst>
+                  <a:ext uri="{0D108BD9-81ED-4DB2-BD59-A6C34878D82A}">
+                    <a16:rowId xmlns:a16="http://schemas.microsoft.com/office/drawing/2014/main" val="2312967690"/>
+                  </a:ext>
+                </a:extLst>
+              </a:tr>
+              <a:tr h="551579">
+                <a:tc>
+                  <a:txBody>
+                    <a:bodyPr/>
+                    <a:lstStyle/>
+                    <a:p>
+                      <a:r>
+                        <a:rPr lang="en-US" sz="1400" b="1" dirty="0"/>
+                        <a:t>2. Parsing</a:t>
+                      </a:r>
+                      <a:endParaRPr lang="en-US" sz="1400" dirty="0"/>
+                    </a:p>
+                  </a:txBody>
+                  <a:tcPr marL="70183" marR="70183" marT="35091" marB="35091" anchor="ctr">
+                    <a:lnL w="12700" cap="flat" cmpd="sng" algn="ctr">
+                      <a:solidFill>
+                        <a:schemeClr val="tx1"/>
+                      </a:solidFill>
+                      <a:prstDash val="solid"/>
+                      <a:round/>
+                      <a:headEnd type="none" w="med" len="med"/>
+                      <a:tailEnd type="none" w="med" len="med"/>
+                    </a:lnL>
+                    <a:lnR w="12700" cap="flat" cmpd="sng" algn="ctr">
+                      <a:solidFill>
+                        <a:schemeClr val="tx1"/>
+                      </a:solidFill>
+                      <a:prstDash val="solid"/>
+                      <a:round/>
+                      <a:headEnd type="none" w="med" len="med"/>
+                      <a:tailEnd type="none" w="med" len="med"/>
+                    </a:lnR>
+                    <a:lnT w="12700" cap="flat" cmpd="sng" algn="ctr">
+                      <a:solidFill>
+                        <a:schemeClr val="tx1"/>
+                      </a:solidFill>
+                      <a:prstDash val="solid"/>
+                      <a:round/>
+                      <a:headEnd type="none" w="med" len="med"/>
+                      <a:tailEnd type="none" w="med" len="med"/>
+                    </a:lnT>
+                    <a:lnB w="12700" cap="flat" cmpd="sng" algn="ctr">
+                      <a:solidFill>
+                        <a:schemeClr val="tx1"/>
+                      </a:solidFill>
+                      <a:prstDash val="solid"/>
+                      <a:round/>
+                      <a:headEnd type="none" w="med" len="med"/>
+                      <a:tailEnd type="none" w="med" len="med"/>
+                    </a:lnB>
+                  </a:tcPr>
+                </a:tc>
+                <a:tc>
+                  <a:txBody>
+                    <a:bodyPr/>
+                    <a:lstStyle/>
+                    <a:p>
+                      <a:r>
+                        <a:rPr lang="en-US" sz="1400"/>
+                        <a:t>Flatten massive JSON/CSV data efficiently</a:t>
+                      </a:r>
+                    </a:p>
+                  </a:txBody>
+                  <a:tcPr marL="70183" marR="70183" marT="35091" marB="35091" anchor="ctr">
+                    <a:lnL w="12700" cap="flat" cmpd="sng" algn="ctr">
+                      <a:solidFill>
+                        <a:schemeClr val="tx1"/>
+                      </a:solidFill>
+                      <a:prstDash val="solid"/>
+                      <a:round/>
+                      <a:headEnd type="none" w="med" len="med"/>
+                      <a:tailEnd type="none" w="med" len="med"/>
+                    </a:lnL>
+                    <a:lnR w="12700" cap="flat" cmpd="sng" algn="ctr">
+                      <a:solidFill>
+                        <a:schemeClr val="tx1"/>
+                      </a:solidFill>
+                      <a:prstDash val="solid"/>
+                      <a:round/>
+                      <a:headEnd type="none" w="med" len="med"/>
+                      <a:tailEnd type="none" w="med" len="med"/>
+                    </a:lnR>
+                    <a:lnT w="12700" cap="flat" cmpd="sng" algn="ctr">
+                      <a:solidFill>
+                        <a:schemeClr val="tx1"/>
+                      </a:solidFill>
+                      <a:prstDash val="solid"/>
+                      <a:round/>
+                      <a:headEnd type="none" w="med" len="med"/>
+                      <a:tailEnd type="none" w="med" len="med"/>
+                    </a:lnT>
+                    <a:lnB w="12700" cap="flat" cmpd="sng" algn="ctr">
+                      <a:solidFill>
+                        <a:schemeClr val="tx1"/>
+                      </a:solidFill>
+                      <a:prstDash val="solid"/>
+                      <a:round/>
+                      <a:headEnd type="none" w="med" len="med"/>
+                      <a:tailEnd type="none" w="med" len="med"/>
+                    </a:lnB>
+                  </a:tcPr>
+                </a:tc>
+                <a:tc>
+                  <a:txBody>
+                    <a:bodyPr/>
+                    <a:lstStyle/>
+                    <a:p>
+                      <a:r>
+                        <a:rPr lang="en-US" sz="1400"/>
+                        <a:t>Spark, Dask, Snowflake External Tables</a:t>
+                      </a:r>
+                    </a:p>
+                  </a:txBody>
+                  <a:tcPr marL="70183" marR="70183" marT="35091" marB="35091" anchor="ctr">
+                    <a:lnL w="12700" cap="flat" cmpd="sng" algn="ctr">
+                      <a:solidFill>
+                        <a:schemeClr val="tx1"/>
+                      </a:solidFill>
+                      <a:prstDash val="solid"/>
+                      <a:round/>
+                      <a:headEnd type="none" w="med" len="med"/>
+                      <a:tailEnd type="none" w="med" len="med"/>
+                    </a:lnL>
+                    <a:lnR w="12700" cap="flat" cmpd="sng" algn="ctr">
+                      <a:solidFill>
+                        <a:schemeClr val="tx1"/>
+                      </a:solidFill>
+                      <a:prstDash val="solid"/>
+                      <a:round/>
+                      <a:headEnd type="none" w="med" len="med"/>
+                      <a:tailEnd type="none" w="med" len="med"/>
+                    </a:lnR>
+                    <a:lnT w="12700" cap="flat" cmpd="sng" algn="ctr">
+                      <a:solidFill>
+                        <a:schemeClr val="tx1"/>
+                      </a:solidFill>
+                      <a:prstDash val="solid"/>
+                      <a:round/>
+                      <a:headEnd type="none" w="med" len="med"/>
+                      <a:tailEnd type="none" w="med" len="med"/>
+                    </a:lnT>
+                    <a:lnB w="12700" cap="flat" cmpd="sng" algn="ctr">
+                      <a:solidFill>
+                        <a:schemeClr val="tx1"/>
+                      </a:solidFill>
+                      <a:prstDash val="solid"/>
+                      <a:round/>
+                      <a:headEnd type="none" w="med" len="med"/>
+                      <a:tailEnd type="none" w="med" len="med"/>
+                    </a:lnB>
+                  </a:tcPr>
+                </a:tc>
+                <a:extLst>
+                  <a:ext uri="{0D108BD9-81ED-4DB2-BD59-A6C34878D82A}">
+                    <a16:rowId xmlns:a16="http://schemas.microsoft.com/office/drawing/2014/main" val="4191458375"/>
+                  </a:ext>
+                </a:extLst>
+              </a:tr>
+              <a:tr h="551579">
+                <a:tc>
+                  <a:txBody>
+                    <a:bodyPr/>
+                    <a:lstStyle/>
+                    <a:p>
+                      <a:r>
+                        <a:rPr lang="en-US" sz="1400" b="1" dirty="0"/>
+                        <a:t>3. Cleaning</a:t>
+                      </a:r>
+                      <a:endParaRPr lang="en-US" sz="1400" dirty="0"/>
+                    </a:p>
+                  </a:txBody>
+                  <a:tcPr marL="70183" marR="70183" marT="35091" marB="35091" anchor="ctr">
+                    <a:lnL w="12700" cap="flat" cmpd="sng" algn="ctr">
+                      <a:solidFill>
+                        <a:schemeClr val="tx1"/>
+                      </a:solidFill>
+                      <a:prstDash val="solid"/>
+                      <a:round/>
+                      <a:headEnd type="none" w="med" len="med"/>
+                      <a:tailEnd type="none" w="med" len="med"/>
+                    </a:lnL>
+                    <a:lnR w="12700" cap="flat" cmpd="sng" algn="ctr">
+                      <a:solidFill>
+                        <a:schemeClr val="tx1"/>
+                      </a:solidFill>
+                      <a:prstDash val="solid"/>
+                      <a:round/>
+                      <a:headEnd type="none" w="med" len="med"/>
+                      <a:tailEnd type="none" w="med" len="med"/>
+                    </a:lnR>
+                    <a:lnT w="12700" cap="flat" cmpd="sng" algn="ctr">
+                      <a:solidFill>
+                        <a:schemeClr val="tx1"/>
+                      </a:solidFill>
+                      <a:prstDash val="solid"/>
+                      <a:round/>
+                      <a:headEnd type="none" w="med" len="med"/>
+                      <a:tailEnd type="none" w="med" len="med"/>
+                    </a:lnT>
+                    <a:lnB w="12700" cap="flat" cmpd="sng" algn="ctr">
+                      <a:solidFill>
+                        <a:schemeClr val="tx1"/>
+                      </a:solidFill>
+                      <a:prstDash val="solid"/>
+                      <a:round/>
+                      <a:headEnd type="none" w="med" len="med"/>
+                      <a:tailEnd type="none" w="med" len="med"/>
+                    </a:lnB>
+                  </a:tcPr>
+                </a:tc>
+                <a:tc>
+                  <a:txBody>
+                    <a:bodyPr/>
+                    <a:lstStyle/>
+                    <a:p>
+                      <a:r>
+                        <a:rPr lang="en-US" sz="1400"/>
+                        <a:t>Remove bad data, duplicates, wrong formats</a:t>
+                      </a:r>
+                    </a:p>
+                  </a:txBody>
+                  <a:tcPr marL="70183" marR="70183" marT="35091" marB="35091" anchor="ctr">
+                    <a:lnL w="12700" cap="flat" cmpd="sng" algn="ctr">
+                      <a:solidFill>
+                        <a:schemeClr val="tx1"/>
+                      </a:solidFill>
+                      <a:prstDash val="solid"/>
+                      <a:round/>
+                      <a:headEnd type="none" w="med" len="med"/>
+                      <a:tailEnd type="none" w="med" len="med"/>
+                    </a:lnL>
+                    <a:lnR w="12700" cap="flat" cmpd="sng" algn="ctr">
+                      <a:solidFill>
+                        <a:schemeClr val="tx1"/>
+                      </a:solidFill>
+                      <a:prstDash val="solid"/>
+                      <a:round/>
+                      <a:headEnd type="none" w="med" len="med"/>
+                      <a:tailEnd type="none" w="med" len="med"/>
+                    </a:lnR>
+                    <a:lnT w="12700" cap="flat" cmpd="sng" algn="ctr">
+                      <a:solidFill>
+                        <a:schemeClr val="tx1"/>
+                      </a:solidFill>
+                      <a:prstDash val="solid"/>
+                      <a:round/>
+                      <a:headEnd type="none" w="med" len="med"/>
+                      <a:tailEnd type="none" w="med" len="med"/>
+                    </a:lnT>
+                    <a:lnB w="12700" cap="flat" cmpd="sng" algn="ctr">
+                      <a:solidFill>
+                        <a:schemeClr val="tx1"/>
+                      </a:solidFill>
+                      <a:prstDash val="solid"/>
+                      <a:round/>
+                      <a:headEnd type="none" w="med" len="med"/>
+                      <a:tailEnd type="none" w="med" len="med"/>
+                    </a:lnB>
+                  </a:tcPr>
+                </a:tc>
+                <a:tc>
+                  <a:txBody>
+                    <a:bodyPr/>
+                    <a:lstStyle/>
+                    <a:p>
+                      <a:r>
+                        <a:rPr lang="en-US" sz="1400"/>
+                        <a:t>Pandera, Great Expectations</a:t>
+                      </a:r>
+                    </a:p>
+                  </a:txBody>
+                  <a:tcPr marL="70183" marR="70183" marT="35091" marB="35091" anchor="ctr">
+                    <a:lnL w="12700" cap="flat" cmpd="sng" algn="ctr">
+                      <a:solidFill>
+                        <a:schemeClr val="tx1"/>
+                      </a:solidFill>
+                      <a:prstDash val="solid"/>
+                      <a:round/>
+                      <a:headEnd type="none" w="med" len="med"/>
+                      <a:tailEnd type="none" w="med" len="med"/>
+                    </a:lnL>
+                    <a:lnR w="12700" cap="flat" cmpd="sng" algn="ctr">
+                      <a:solidFill>
+                        <a:schemeClr val="tx1"/>
+                      </a:solidFill>
+                      <a:prstDash val="solid"/>
+                      <a:round/>
+                      <a:headEnd type="none" w="med" len="med"/>
+                      <a:tailEnd type="none" w="med" len="med"/>
+                    </a:lnR>
+                    <a:lnT w="12700" cap="flat" cmpd="sng" algn="ctr">
+                      <a:solidFill>
+                        <a:schemeClr val="tx1"/>
+                      </a:solidFill>
+                      <a:prstDash val="solid"/>
+                      <a:round/>
+                      <a:headEnd type="none" w="med" len="med"/>
+                      <a:tailEnd type="none" w="med" len="med"/>
+                    </a:lnT>
+                    <a:lnB w="12700" cap="flat" cmpd="sng" algn="ctr">
+                      <a:solidFill>
+                        <a:schemeClr val="tx1"/>
+                      </a:solidFill>
+                      <a:prstDash val="solid"/>
+                      <a:round/>
+                      <a:headEnd type="none" w="med" len="med"/>
+                      <a:tailEnd type="none" w="med" len="med"/>
+                    </a:lnB>
+                  </a:tcPr>
+                </a:tc>
+                <a:extLst>
+                  <a:ext uri="{0D108BD9-81ED-4DB2-BD59-A6C34878D82A}">
+                    <a16:rowId xmlns:a16="http://schemas.microsoft.com/office/drawing/2014/main" val="558904304"/>
+                  </a:ext>
+                </a:extLst>
+              </a:tr>
+              <a:tr h="551579">
+                <a:tc>
+                  <a:txBody>
+                    <a:bodyPr/>
+                    <a:lstStyle/>
+                    <a:p>
+                      <a:r>
+                        <a:rPr lang="en-US" sz="1400" b="1" dirty="0"/>
+                        <a:t>4. Identity Graph</a:t>
+                      </a:r>
+                      <a:endParaRPr lang="en-US" sz="1400" dirty="0"/>
+                    </a:p>
+                  </a:txBody>
+                  <a:tcPr marL="70183" marR="70183" marT="35091" marB="35091" anchor="ctr">
+                    <a:lnL w="12700" cap="flat" cmpd="sng" algn="ctr">
+                      <a:solidFill>
+                        <a:schemeClr val="tx1"/>
+                      </a:solidFill>
+                      <a:prstDash val="solid"/>
+                      <a:round/>
+                      <a:headEnd type="none" w="med" len="med"/>
+                      <a:tailEnd type="none" w="med" len="med"/>
+                    </a:lnL>
+                    <a:lnR w="12700" cap="flat" cmpd="sng" algn="ctr">
+                      <a:solidFill>
+                        <a:schemeClr val="tx1"/>
+                      </a:solidFill>
+                      <a:prstDash val="solid"/>
+                      <a:round/>
+                      <a:headEnd type="none" w="med" len="med"/>
+                      <a:tailEnd type="none" w="med" len="med"/>
+                    </a:lnR>
+                    <a:lnT w="12700" cap="flat" cmpd="sng" algn="ctr">
+                      <a:solidFill>
+                        <a:schemeClr val="tx1"/>
+                      </a:solidFill>
+                      <a:prstDash val="solid"/>
+                      <a:round/>
+                      <a:headEnd type="none" w="med" len="med"/>
+                      <a:tailEnd type="none" w="med" len="med"/>
+                    </a:lnT>
+                    <a:lnB w="12700" cap="flat" cmpd="sng" algn="ctr">
+                      <a:solidFill>
+                        <a:schemeClr val="tx1"/>
+                      </a:solidFill>
+                      <a:prstDash val="solid"/>
+                      <a:round/>
+                      <a:headEnd type="none" w="med" len="med"/>
+                      <a:tailEnd type="none" w="med" len="med"/>
+                    </a:lnB>
+                  </a:tcPr>
+                </a:tc>
+                <a:tc>
+                  <a:txBody>
+                    <a:bodyPr/>
+                    <a:lstStyle/>
+                    <a:p>
+                      <a:r>
+                        <a:rPr lang="en-US" sz="1400" dirty="0"/>
+                        <a:t>Create unique provider mapping</a:t>
+                      </a:r>
+                    </a:p>
+                  </a:txBody>
+                  <a:tcPr marL="70183" marR="70183" marT="35091" marB="35091" anchor="ctr">
+                    <a:lnL w="12700" cap="flat" cmpd="sng" algn="ctr">
+                      <a:solidFill>
+                        <a:schemeClr val="tx1"/>
+                      </a:solidFill>
+                      <a:prstDash val="solid"/>
+                      <a:round/>
+                      <a:headEnd type="none" w="med" len="med"/>
+                      <a:tailEnd type="none" w="med" len="med"/>
+                    </a:lnL>
+                    <a:lnR w="12700" cap="flat" cmpd="sng" algn="ctr">
+                      <a:solidFill>
+                        <a:schemeClr val="tx1"/>
+                      </a:solidFill>
+                      <a:prstDash val="solid"/>
+                      <a:round/>
+                      <a:headEnd type="none" w="med" len="med"/>
+                      <a:tailEnd type="none" w="med" len="med"/>
+                    </a:lnR>
+                    <a:lnT w="12700" cap="flat" cmpd="sng" algn="ctr">
+                      <a:solidFill>
+                        <a:schemeClr val="tx1"/>
+                      </a:solidFill>
+                      <a:prstDash val="solid"/>
+                      <a:round/>
+                      <a:headEnd type="none" w="med" len="med"/>
+                      <a:tailEnd type="none" w="med" len="med"/>
+                    </a:lnT>
+                    <a:lnB w="12700" cap="flat" cmpd="sng" algn="ctr">
+                      <a:solidFill>
+                        <a:schemeClr val="tx1"/>
+                      </a:solidFill>
+                      <a:prstDash val="solid"/>
+                      <a:round/>
+                      <a:headEnd type="none" w="med" len="med"/>
+                      <a:tailEnd type="none" w="med" len="med"/>
+                    </a:lnB>
+                  </a:tcPr>
+                </a:tc>
+                <a:tc>
+                  <a:txBody>
+                    <a:bodyPr/>
+                    <a:lstStyle/>
+                    <a:p>
+                      <a:r>
+                        <a:rPr lang="en-US" sz="1400"/>
+                        <a:t>Neo4j, NetworkX, SQL Graph Tables</a:t>
+                      </a:r>
+                    </a:p>
+                  </a:txBody>
+                  <a:tcPr marL="70183" marR="70183" marT="35091" marB="35091" anchor="ctr">
+                    <a:lnL w="12700" cap="flat" cmpd="sng" algn="ctr">
+                      <a:solidFill>
+                        <a:schemeClr val="tx1"/>
+                      </a:solidFill>
+                      <a:prstDash val="solid"/>
+                      <a:round/>
+                      <a:headEnd type="none" w="med" len="med"/>
+                      <a:tailEnd type="none" w="med" len="med"/>
+                    </a:lnL>
+                    <a:lnR w="12700" cap="flat" cmpd="sng" algn="ctr">
+                      <a:solidFill>
+                        <a:schemeClr val="tx1"/>
+                      </a:solidFill>
+                      <a:prstDash val="solid"/>
+                      <a:round/>
+                      <a:headEnd type="none" w="med" len="med"/>
+                      <a:tailEnd type="none" w="med" len="med"/>
+                    </a:lnR>
+                    <a:lnT w="12700" cap="flat" cmpd="sng" algn="ctr">
+                      <a:solidFill>
+                        <a:schemeClr val="tx1"/>
+                      </a:solidFill>
+                      <a:prstDash val="solid"/>
+                      <a:round/>
+                      <a:headEnd type="none" w="med" len="med"/>
+                      <a:tailEnd type="none" w="med" len="med"/>
+                    </a:lnT>
+                    <a:lnB w="12700" cap="flat" cmpd="sng" algn="ctr">
+                      <a:solidFill>
+                        <a:schemeClr val="tx1"/>
+                      </a:solidFill>
+                      <a:prstDash val="solid"/>
+                      <a:round/>
+                      <a:headEnd type="none" w="med" len="med"/>
+                      <a:tailEnd type="none" w="med" len="med"/>
+                    </a:lnB>
+                  </a:tcPr>
+                </a:tc>
+                <a:extLst>
+                  <a:ext uri="{0D108BD9-81ED-4DB2-BD59-A6C34878D82A}">
+                    <a16:rowId xmlns:a16="http://schemas.microsoft.com/office/drawing/2014/main" val="3527330980"/>
+                  </a:ext>
+                </a:extLst>
+              </a:tr>
+              <a:tr h="551579">
+                <a:tc>
+                  <a:txBody>
+                    <a:bodyPr/>
+                    <a:lstStyle/>
+                    <a:p>
+                      <a:r>
+                        <a:rPr lang="en-US" sz="1400" b="1" dirty="0"/>
+                        <a:t>5. Normalization</a:t>
+                      </a:r>
+                      <a:endParaRPr lang="en-US" sz="1400" dirty="0"/>
+                    </a:p>
+                  </a:txBody>
+                  <a:tcPr marL="70183" marR="70183" marT="35091" marB="35091" anchor="ctr">
+                    <a:lnL w="12700" cap="flat" cmpd="sng" algn="ctr">
+                      <a:solidFill>
+                        <a:schemeClr val="tx1"/>
+                      </a:solidFill>
+                      <a:prstDash val="solid"/>
+                      <a:round/>
+                      <a:headEnd type="none" w="med" len="med"/>
+                      <a:tailEnd type="none" w="med" len="med"/>
+                    </a:lnL>
+                    <a:lnR w="12700" cap="flat" cmpd="sng" algn="ctr">
+                      <a:solidFill>
+                        <a:schemeClr val="tx1"/>
+                      </a:solidFill>
+                      <a:prstDash val="solid"/>
+                      <a:round/>
+                      <a:headEnd type="none" w="med" len="med"/>
+                      <a:tailEnd type="none" w="med" len="med"/>
+                    </a:lnR>
+                    <a:lnT w="12700" cap="flat" cmpd="sng" algn="ctr">
+                      <a:solidFill>
+                        <a:schemeClr val="tx1"/>
+                      </a:solidFill>
+                      <a:prstDash val="solid"/>
+                      <a:round/>
+                      <a:headEnd type="none" w="med" len="med"/>
+                      <a:tailEnd type="none" w="med" len="med"/>
+                    </a:lnT>
+                    <a:lnB w="12700" cap="flat" cmpd="sng" algn="ctr">
+                      <a:solidFill>
+                        <a:schemeClr val="tx1"/>
+                      </a:solidFill>
+                      <a:prstDash val="solid"/>
+                      <a:round/>
+                      <a:headEnd type="none" w="med" len="med"/>
+                      <a:tailEnd type="none" w="med" len="med"/>
+                    </a:lnB>
+                  </a:tcPr>
+                </a:tc>
+                <a:tc>
+                  <a:txBody>
+                    <a:bodyPr/>
+                    <a:lstStyle/>
+                    <a:p>
+                      <a:r>
+                        <a:rPr lang="en-US" sz="1400" dirty="0"/>
+                        <a:t>Make data consistent across payers</a:t>
+                      </a:r>
+                    </a:p>
+                  </a:txBody>
+                  <a:tcPr marL="70183" marR="70183" marT="35091" marB="35091" anchor="ctr">
+                    <a:lnL w="12700" cap="flat" cmpd="sng" algn="ctr">
+                      <a:solidFill>
+                        <a:schemeClr val="tx1"/>
+                      </a:solidFill>
+                      <a:prstDash val="solid"/>
+                      <a:round/>
+                      <a:headEnd type="none" w="med" len="med"/>
+                      <a:tailEnd type="none" w="med" len="med"/>
+                    </a:lnL>
+                    <a:lnR w="12700" cap="flat" cmpd="sng" algn="ctr">
+                      <a:solidFill>
+                        <a:schemeClr val="tx1"/>
+                      </a:solidFill>
+                      <a:prstDash val="solid"/>
+                      <a:round/>
+                      <a:headEnd type="none" w="med" len="med"/>
+                      <a:tailEnd type="none" w="med" len="med"/>
+                    </a:lnR>
+                    <a:lnT w="12700" cap="flat" cmpd="sng" algn="ctr">
+                      <a:solidFill>
+                        <a:schemeClr val="tx1"/>
+                      </a:solidFill>
+                      <a:prstDash val="solid"/>
+                      <a:round/>
+                      <a:headEnd type="none" w="med" len="med"/>
+                      <a:tailEnd type="none" w="med" len="med"/>
+                    </a:lnT>
+                    <a:lnB w="12700" cap="flat" cmpd="sng" algn="ctr">
+                      <a:solidFill>
+                        <a:schemeClr val="tx1"/>
+                      </a:solidFill>
+                      <a:prstDash val="solid"/>
+                      <a:round/>
+                      <a:headEnd type="none" w="med" len="med"/>
+                      <a:tailEnd type="none" w="med" len="med"/>
+                    </a:lnB>
+                  </a:tcPr>
+                </a:tc>
+                <a:tc>
+                  <a:txBody>
+                    <a:bodyPr/>
+                    <a:lstStyle/>
+                    <a:p>
+                      <a:r>
+                        <a:rPr lang="en-US" sz="1400"/>
+                        <a:t>Python ETL, dbt, Pandas pipelines</a:t>
+                      </a:r>
+                    </a:p>
+                  </a:txBody>
+                  <a:tcPr marL="70183" marR="70183" marT="35091" marB="35091" anchor="ctr">
+                    <a:lnL w="12700" cap="flat" cmpd="sng" algn="ctr">
+                      <a:solidFill>
+                        <a:schemeClr val="tx1"/>
+                      </a:solidFill>
+                      <a:prstDash val="solid"/>
+                      <a:round/>
+                      <a:headEnd type="none" w="med" len="med"/>
+                      <a:tailEnd type="none" w="med" len="med"/>
+                    </a:lnL>
+                    <a:lnR w="12700" cap="flat" cmpd="sng" algn="ctr">
+                      <a:solidFill>
+                        <a:schemeClr val="tx1"/>
+                      </a:solidFill>
+                      <a:prstDash val="solid"/>
+                      <a:round/>
+                      <a:headEnd type="none" w="med" len="med"/>
+                      <a:tailEnd type="none" w="med" len="med"/>
+                    </a:lnR>
+                    <a:lnT w="12700" cap="flat" cmpd="sng" algn="ctr">
+                      <a:solidFill>
+                        <a:schemeClr val="tx1"/>
+                      </a:solidFill>
+                      <a:prstDash val="solid"/>
+                      <a:round/>
+                      <a:headEnd type="none" w="med" len="med"/>
+                      <a:tailEnd type="none" w="med" len="med"/>
+                    </a:lnT>
+                    <a:lnB w="12700" cap="flat" cmpd="sng" algn="ctr">
+                      <a:solidFill>
+                        <a:schemeClr val="tx1"/>
+                      </a:solidFill>
+                      <a:prstDash val="solid"/>
+                      <a:round/>
+                      <a:headEnd type="none" w="med" len="med"/>
+                      <a:tailEnd type="none" w="med" len="med"/>
+                    </a:lnB>
+                  </a:tcPr>
+                </a:tc>
+                <a:extLst>
+                  <a:ext uri="{0D108BD9-81ED-4DB2-BD59-A6C34878D82A}">
+                    <a16:rowId xmlns:a16="http://schemas.microsoft.com/office/drawing/2014/main" val="1574063357"/>
+                  </a:ext>
+                </a:extLst>
+              </a:tr>
+              <a:tr h="551579">
+                <a:tc>
+                  <a:txBody>
+                    <a:bodyPr/>
+                    <a:lstStyle/>
+                    <a:p>
+                      <a:r>
+                        <a:rPr lang="en-US" sz="1400" b="1"/>
+                        <a:t>6. Integration</a:t>
+                      </a:r>
+                      <a:endParaRPr lang="en-US" sz="1400"/>
+                    </a:p>
+                  </a:txBody>
+                  <a:tcPr marL="70183" marR="70183" marT="35091" marB="35091" anchor="ctr">
+                    <a:lnL w="12700" cap="flat" cmpd="sng" algn="ctr">
+                      <a:solidFill>
+                        <a:schemeClr val="tx1"/>
+                      </a:solidFill>
+                      <a:prstDash val="solid"/>
+                      <a:round/>
+                      <a:headEnd type="none" w="med" len="med"/>
+                      <a:tailEnd type="none" w="med" len="med"/>
+                    </a:lnL>
+                    <a:lnR w="12700" cap="flat" cmpd="sng" algn="ctr">
+                      <a:solidFill>
+                        <a:schemeClr val="tx1"/>
+                      </a:solidFill>
+                      <a:prstDash val="solid"/>
+                      <a:round/>
+                      <a:headEnd type="none" w="med" len="med"/>
+                      <a:tailEnd type="none" w="med" len="med"/>
+                    </a:lnR>
+                    <a:lnT w="12700" cap="flat" cmpd="sng" algn="ctr">
+                      <a:solidFill>
+                        <a:schemeClr val="tx1"/>
+                      </a:solidFill>
+                      <a:prstDash val="solid"/>
+                      <a:round/>
+                      <a:headEnd type="none" w="med" len="med"/>
+                      <a:tailEnd type="none" w="med" len="med"/>
+                    </a:lnT>
+                    <a:lnB w="12700" cap="flat" cmpd="sng" algn="ctr">
+                      <a:solidFill>
+                        <a:schemeClr val="tx1"/>
+                      </a:solidFill>
+                      <a:prstDash val="solid"/>
+                      <a:round/>
+                      <a:headEnd type="none" w="med" len="med"/>
+                      <a:tailEnd type="none" w="med" len="med"/>
+                    </a:lnB>
+                  </a:tcPr>
+                </a:tc>
+                <a:tc>
+                  <a:txBody>
+                    <a:bodyPr/>
+                    <a:lstStyle/>
+                    <a:p>
+                      <a:r>
+                        <a:rPr lang="en-US" sz="1400" dirty="0"/>
+                        <a:t>Join datasets for benchmarking</a:t>
+                      </a:r>
+                    </a:p>
+                  </a:txBody>
+                  <a:tcPr marL="70183" marR="70183" marT="35091" marB="35091" anchor="ctr">
+                    <a:lnL w="12700" cap="flat" cmpd="sng" algn="ctr">
+                      <a:solidFill>
+                        <a:schemeClr val="tx1"/>
+                      </a:solidFill>
+                      <a:prstDash val="solid"/>
+                      <a:round/>
+                      <a:headEnd type="none" w="med" len="med"/>
+                      <a:tailEnd type="none" w="med" len="med"/>
+                    </a:lnL>
+                    <a:lnR w="12700" cap="flat" cmpd="sng" algn="ctr">
+                      <a:solidFill>
+                        <a:schemeClr val="tx1"/>
+                      </a:solidFill>
+                      <a:prstDash val="solid"/>
+                      <a:round/>
+                      <a:headEnd type="none" w="med" len="med"/>
+                      <a:tailEnd type="none" w="med" len="med"/>
+                    </a:lnR>
+                    <a:lnT w="12700" cap="flat" cmpd="sng" algn="ctr">
+                      <a:solidFill>
+                        <a:schemeClr val="tx1"/>
+                      </a:solidFill>
+                      <a:prstDash val="solid"/>
+                      <a:round/>
+                      <a:headEnd type="none" w="med" len="med"/>
+                      <a:tailEnd type="none" w="med" len="med"/>
+                    </a:lnT>
+                    <a:lnB w="12700" cap="flat" cmpd="sng" algn="ctr">
+                      <a:solidFill>
+                        <a:schemeClr val="tx1"/>
+                      </a:solidFill>
+                      <a:prstDash val="solid"/>
+                      <a:round/>
+                      <a:headEnd type="none" w="med" len="med"/>
+                      <a:tailEnd type="none" w="med" len="med"/>
+                    </a:lnB>
+                  </a:tcPr>
+                </a:tc>
+                <a:tc>
+                  <a:txBody>
+                    <a:bodyPr/>
+                    <a:lstStyle/>
+                    <a:p>
+                      <a:r>
+                        <a:rPr lang="en-US" sz="1400"/>
+                        <a:t>Snowflake SQL, BigQuery, Delta Lake</a:t>
+                      </a:r>
+                    </a:p>
+                  </a:txBody>
+                  <a:tcPr marL="70183" marR="70183" marT="35091" marB="35091" anchor="ctr">
+                    <a:lnL w="12700" cap="flat" cmpd="sng" algn="ctr">
+                      <a:solidFill>
+                        <a:schemeClr val="tx1"/>
+                      </a:solidFill>
+                      <a:prstDash val="solid"/>
+                      <a:round/>
+                      <a:headEnd type="none" w="med" len="med"/>
+                      <a:tailEnd type="none" w="med" len="med"/>
+                    </a:lnL>
+                    <a:lnR w="12700" cap="flat" cmpd="sng" algn="ctr">
+                      <a:solidFill>
+                        <a:schemeClr val="tx1"/>
+                      </a:solidFill>
+                      <a:prstDash val="solid"/>
+                      <a:round/>
+                      <a:headEnd type="none" w="med" len="med"/>
+                      <a:tailEnd type="none" w="med" len="med"/>
+                    </a:lnR>
+                    <a:lnT w="12700" cap="flat" cmpd="sng" algn="ctr">
+                      <a:solidFill>
+                        <a:schemeClr val="tx1"/>
+                      </a:solidFill>
+                      <a:prstDash val="solid"/>
+                      <a:round/>
+                      <a:headEnd type="none" w="med" len="med"/>
+                      <a:tailEnd type="none" w="med" len="med"/>
+                    </a:lnT>
+                    <a:lnB w="12700" cap="flat" cmpd="sng" algn="ctr">
+                      <a:solidFill>
+                        <a:schemeClr val="tx1"/>
+                      </a:solidFill>
+                      <a:prstDash val="solid"/>
+                      <a:round/>
+                      <a:headEnd type="none" w="med" len="med"/>
+                      <a:tailEnd type="none" w="med" len="med"/>
+                    </a:lnB>
+                  </a:tcPr>
+                </a:tc>
+                <a:extLst>
+                  <a:ext uri="{0D108BD9-81ED-4DB2-BD59-A6C34878D82A}">
+                    <a16:rowId xmlns:a16="http://schemas.microsoft.com/office/drawing/2014/main" val="4230002691"/>
+                  </a:ext>
+                </a:extLst>
+              </a:tr>
+              <a:tr h="551579">
+                <a:tc>
+                  <a:txBody>
+                    <a:bodyPr/>
+                    <a:lstStyle/>
+                    <a:p>
+                      <a:r>
+                        <a:rPr lang="en-US" sz="1400" b="1" dirty="0"/>
+                        <a:t>7. Modeling</a:t>
+                      </a:r>
+                      <a:endParaRPr lang="en-US" sz="1400" dirty="0"/>
+                    </a:p>
+                  </a:txBody>
+                  <a:tcPr marL="70183" marR="70183" marT="35091" marB="35091" anchor="ctr">
+                    <a:lnL w="12700" cap="flat" cmpd="sng" algn="ctr">
+                      <a:solidFill>
+                        <a:schemeClr val="tx1"/>
+                      </a:solidFill>
+                      <a:prstDash val="solid"/>
+                      <a:round/>
+                      <a:headEnd type="none" w="med" len="med"/>
+                      <a:tailEnd type="none" w="med" len="med"/>
+                    </a:lnL>
+                    <a:lnR w="12700" cap="flat" cmpd="sng" algn="ctr">
+                      <a:solidFill>
+                        <a:schemeClr val="tx1"/>
+                      </a:solidFill>
+                      <a:prstDash val="solid"/>
+                      <a:round/>
+                      <a:headEnd type="none" w="med" len="med"/>
+                      <a:tailEnd type="none" w="med" len="med"/>
+                    </a:lnR>
+                    <a:lnT w="12700" cap="flat" cmpd="sng" algn="ctr">
+                      <a:solidFill>
+                        <a:schemeClr val="tx1"/>
+                      </a:solidFill>
+                      <a:prstDash val="solid"/>
+                      <a:round/>
+                      <a:headEnd type="none" w="med" len="med"/>
+                      <a:tailEnd type="none" w="med" len="med"/>
+                    </a:lnT>
+                    <a:lnB w="12700" cap="flat" cmpd="sng" algn="ctr">
+                      <a:solidFill>
+                        <a:schemeClr val="tx1"/>
+                      </a:solidFill>
+                      <a:prstDash val="solid"/>
+                      <a:round/>
+                      <a:headEnd type="none" w="med" len="med"/>
+                      <a:tailEnd type="none" w="med" len="med"/>
+                    </a:lnB>
+                  </a:tcPr>
+                </a:tc>
+                <a:tc>
+                  <a:txBody>
+                    <a:bodyPr/>
+                    <a:lstStyle/>
+                    <a:p>
+                      <a:r>
+                        <a:rPr lang="en-US" sz="1400" dirty="0"/>
+                        <a:t>Compute risk, cost, adequacy analytics</a:t>
+                      </a:r>
+                    </a:p>
+                  </a:txBody>
+                  <a:tcPr marL="70183" marR="70183" marT="35091" marB="35091" anchor="ctr">
+                    <a:lnL w="12700" cap="flat" cmpd="sng" algn="ctr">
+                      <a:solidFill>
+                        <a:schemeClr val="tx1"/>
+                      </a:solidFill>
+                      <a:prstDash val="solid"/>
+                      <a:round/>
+                      <a:headEnd type="none" w="med" len="med"/>
+                      <a:tailEnd type="none" w="med" len="med"/>
+                    </a:lnL>
+                    <a:lnR w="12700" cap="flat" cmpd="sng" algn="ctr">
+                      <a:solidFill>
+                        <a:schemeClr val="tx1"/>
+                      </a:solidFill>
+                      <a:prstDash val="solid"/>
+                      <a:round/>
+                      <a:headEnd type="none" w="med" len="med"/>
+                      <a:tailEnd type="none" w="med" len="med"/>
+                    </a:lnR>
+                    <a:lnT w="12700" cap="flat" cmpd="sng" algn="ctr">
+                      <a:solidFill>
+                        <a:schemeClr val="tx1"/>
+                      </a:solidFill>
+                      <a:prstDash val="solid"/>
+                      <a:round/>
+                      <a:headEnd type="none" w="med" len="med"/>
+                      <a:tailEnd type="none" w="med" len="med"/>
+                    </a:lnT>
+                    <a:lnB w="12700" cap="flat" cmpd="sng" algn="ctr">
+                      <a:solidFill>
+                        <a:schemeClr val="tx1"/>
+                      </a:solidFill>
+                      <a:prstDash val="solid"/>
+                      <a:round/>
+                      <a:headEnd type="none" w="med" len="med"/>
+                      <a:tailEnd type="none" w="med" len="med"/>
+                    </a:lnB>
+                  </a:tcPr>
+                </a:tc>
+                <a:tc>
+                  <a:txBody>
+                    <a:bodyPr/>
+                    <a:lstStyle/>
+                    <a:p>
+                      <a:r>
+                        <a:rPr lang="en-US" sz="1400" dirty="0"/>
+                        <a:t>Python (</a:t>
+                      </a:r>
+                      <a:r>
+                        <a:rPr lang="en-US" sz="1400" dirty="0" err="1"/>
+                        <a:t>scikit</a:t>
+                      </a:r>
+                      <a:r>
+                        <a:rPr lang="en-US" sz="1400" dirty="0"/>
+                        <a:t>-learn, </a:t>
+                      </a:r>
+                      <a:r>
+                        <a:rPr lang="en-US" sz="1400" dirty="0" err="1"/>
+                        <a:t>GeoPandas</a:t>
+                      </a:r>
+                      <a:r>
+                        <a:rPr lang="en-US" sz="1400" dirty="0"/>
+                        <a:t>)</a:t>
+                      </a:r>
+                    </a:p>
+                  </a:txBody>
+                  <a:tcPr marL="70183" marR="70183" marT="35091" marB="35091" anchor="ctr">
+                    <a:lnL w="12700" cap="flat" cmpd="sng" algn="ctr">
+                      <a:solidFill>
+                        <a:schemeClr val="tx1"/>
+                      </a:solidFill>
+                      <a:prstDash val="solid"/>
+                      <a:round/>
+                      <a:headEnd type="none" w="med" len="med"/>
+                      <a:tailEnd type="none" w="med" len="med"/>
+                    </a:lnL>
+                    <a:lnR w="12700" cap="flat" cmpd="sng" algn="ctr">
+                      <a:solidFill>
+                        <a:schemeClr val="tx1"/>
+                      </a:solidFill>
+                      <a:prstDash val="solid"/>
+                      <a:round/>
+                      <a:headEnd type="none" w="med" len="med"/>
+                      <a:tailEnd type="none" w="med" len="med"/>
+                    </a:lnR>
+                    <a:lnT w="12700" cap="flat" cmpd="sng" algn="ctr">
+                      <a:solidFill>
+                        <a:schemeClr val="tx1"/>
+                      </a:solidFill>
+                      <a:prstDash val="solid"/>
+                      <a:round/>
+                      <a:headEnd type="none" w="med" len="med"/>
+                      <a:tailEnd type="none" w="med" len="med"/>
+                    </a:lnT>
+                    <a:lnB w="12700" cap="flat" cmpd="sng" algn="ctr">
+                      <a:solidFill>
+                        <a:schemeClr val="tx1"/>
+                      </a:solidFill>
+                      <a:prstDash val="solid"/>
+                      <a:round/>
+                      <a:headEnd type="none" w="med" len="med"/>
+                      <a:tailEnd type="none" w="med" len="med"/>
+                    </a:lnB>
+                  </a:tcPr>
+                </a:tc>
+                <a:extLst>
+                  <a:ext uri="{0D108BD9-81ED-4DB2-BD59-A6C34878D82A}">
+                    <a16:rowId xmlns:a16="http://schemas.microsoft.com/office/drawing/2014/main" val="2309103528"/>
+                  </a:ext>
+                </a:extLst>
+              </a:tr>
+              <a:tr h="551579">
+                <a:tc>
+                  <a:txBody>
+                    <a:bodyPr/>
+                    <a:lstStyle/>
+                    <a:p>
+                      <a:r>
+                        <a:rPr lang="en-US" sz="1400" b="1"/>
+                        <a:t>8. Curated Store</a:t>
+                      </a:r>
+                      <a:endParaRPr lang="en-US" sz="1400"/>
+                    </a:p>
+                  </a:txBody>
+                  <a:tcPr marL="70183" marR="70183" marT="35091" marB="35091" anchor="ctr">
+                    <a:lnL w="12700" cap="flat" cmpd="sng" algn="ctr">
+                      <a:solidFill>
+                        <a:schemeClr val="tx1"/>
+                      </a:solidFill>
+                      <a:prstDash val="solid"/>
+                      <a:round/>
+                      <a:headEnd type="none" w="med" len="med"/>
+                      <a:tailEnd type="none" w="med" len="med"/>
+                    </a:lnL>
+                    <a:lnR w="12700" cap="flat" cmpd="sng" algn="ctr">
+                      <a:solidFill>
+                        <a:schemeClr val="tx1"/>
+                      </a:solidFill>
+                      <a:prstDash val="solid"/>
+                      <a:round/>
+                      <a:headEnd type="none" w="med" len="med"/>
+                      <a:tailEnd type="none" w="med" len="med"/>
+                    </a:lnR>
+                    <a:lnT w="12700" cap="flat" cmpd="sng" algn="ctr">
+                      <a:solidFill>
+                        <a:schemeClr val="tx1"/>
+                      </a:solidFill>
+                      <a:prstDash val="solid"/>
+                      <a:round/>
+                      <a:headEnd type="none" w="med" len="med"/>
+                      <a:tailEnd type="none" w="med" len="med"/>
+                    </a:lnT>
+                    <a:lnB w="12700" cap="flat" cmpd="sng" algn="ctr">
+                      <a:solidFill>
+                        <a:schemeClr val="tx1"/>
+                      </a:solidFill>
+                      <a:prstDash val="solid"/>
+                      <a:round/>
+                      <a:headEnd type="none" w="med" len="med"/>
+                      <a:tailEnd type="none" w="med" len="med"/>
+                    </a:lnB>
+                  </a:tcPr>
+                </a:tc>
+                <a:tc>
+                  <a:txBody>
+                    <a:bodyPr/>
+                    <a:lstStyle/>
+                    <a:p>
+                      <a:r>
+                        <a:rPr lang="en-US" sz="1400" dirty="0"/>
+                        <a:t>Central, query-ready data warehouse</a:t>
+                      </a:r>
+                    </a:p>
+                  </a:txBody>
+                  <a:tcPr marL="70183" marR="70183" marT="35091" marB="35091" anchor="ctr">
+                    <a:lnL w="12700" cap="flat" cmpd="sng" algn="ctr">
+                      <a:solidFill>
+                        <a:schemeClr val="tx1"/>
+                      </a:solidFill>
+                      <a:prstDash val="solid"/>
+                      <a:round/>
+                      <a:headEnd type="none" w="med" len="med"/>
+                      <a:tailEnd type="none" w="med" len="med"/>
+                    </a:lnL>
+                    <a:lnR w="12700" cap="flat" cmpd="sng" algn="ctr">
+                      <a:solidFill>
+                        <a:schemeClr val="tx1"/>
+                      </a:solidFill>
+                      <a:prstDash val="solid"/>
+                      <a:round/>
+                      <a:headEnd type="none" w="med" len="med"/>
+                      <a:tailEnd type="none" w="med" len="med"/>
+                    </a:lnR>
+                    <a:lnT w="12700" cap="flat" cmpd="sng" algn="ctr">
+                      <a:solidFill>
+                        <a:schemeClr val="tx1"/>
+                      </a:solidFill>
+                      <a:prstDash val="solid"/>
+                      <a:round/>
+                      <a:headEnd type="none" w="med" len="med"/>
+                      <a:tailEnd type="none" w="med" len="med"/>
+                    </a:lnT>
+                    <a:lnB w="12700" cap="flat" cmpd="sng" algn="ctr">
+                      <a:solidFill>
+                        <a:schemeClr val="tx1"/>
+                      </a:solidFill>
+                      <a:prstDash val="solid"/>
+                      <a:round/>
+                      <a:headEnd type="none" w="med" len="med"/>
+                      <a:tailEnd type="none" w="med" len="med"/>
+                    </a:lnB>
+                  </a:tcPr>
+                </a:tc>
+                <a:tc>
+                  <a:txBody>
+                    <a:bodyPr/>
+                    <a:lstStyle/>
+                    <a:p>
+                      <a:r>
+                        <a:rPr lang="en-US" sz="1400" dirty="0"/>
+                        <a:t>Snowflake / </a:t>
+                      </a:r>
+                      <a:r>
+                        <a:rPr lang="en-US" sz="1400" dirty="0" err="1"/>
+                        <a:t>BigQuery</a:t>
+                      </a:r>
+                      <a:r>
+                        <a:rPr lang="en-US" sz="1400" dirty="0"/>
+                        <a:t> / </a:t>
+                      </a:r>
+                      <a:r>
+                        <a:rPr lang="en-US" sz="1400" dirty="0" err="1"/>
+                        <a:t>Databricks</a:t>
+                      </a:r>
+                      <a:endParaRPr lang="en-US" sz="1400" dirty="0"/>
+                    </a:p>
+                  </a:txBody>
+                  <a:tcPr marL="70183" marR="70183" marT="35091" marB="35091" anchor="ctr">
+                    <a:lnL w="12700" cap="flat" cmpd="sng" algn="ctr">
+                      <a:solidFill>
+                        <a:schemeClr val="tx1"/>
+                      </a:solidFill>
+                      <a:prstDash val="solid"/>
+                      <a:round/>
+                      <a:headEnd type="none" w="med" len="med"/>
+                      <a:tailEnd type="none" w="med" len="med"/>
+                    </a:lnL>
+                    <a:lnR w="12700" cap="flat" cmpd="sng" algn="ctr">
+                      <a:solidFill>
+                        <a:schemeClr val="tx1"/>
+                      </a:solidFill>
+                      <a:prstDash val="solid"/>
+                      <a:round/>
+                      <a:headEnd type="none" w="med" len="med"/>
+                      <a:tailEnd type="none" w="med" len="med"/>
+                    </a:lnR>
+                    <a:lnT w="12700" cap="flat" cmpd="sng" algn="ctr">
+                      <a:solidFill>
+                        <a:schemeClr val="tx1"/>
+                      </a:solidFill>
+                      <a:prstDash val="solid"/>
+                      <a:round/>
+                      <a:headEnd type="none" w="med" len="med"/>
+                      <a:tailEnd type="none" w="med" len="med"/>
+                    </a:lnT>
+                    <a:lnB w="12700" cap="flat" cmpd="sng" algn="ctr">
+                      <a:solidFill>
+                        <a:schemeClr val="tx1"/>
+                      </a:solidFill>
+                      <a:prstDash val="solid"/>
+                      <a:round/>
+                      <a:headEnd type="none" w="med" len="med"/>
+                      <a:tailEnd type="none" w="med" len="med"/>
+                    </a:lnB>
+                  </a:tcPr>
+                </a:tc>
+                <a:extLst>
+                  <a:ext uri="{0D108BD9-81ED-4DB2-BD59-A6C34878D82A}">
+                    <a16:rowId xmlns:a16="http://schemas.microsoft.com/office/drawing/2014/main" val="3594759524"/>
+                  </a:ext>
+                </a:extLst>
+              </a:tr>
+              <a:tr h="551579">
+                <a:tc>
+                  <a:txBody>
+                    <a:bodyPr/>
+                    <a:lstStyle/>
+                    <a:p>
+                      <a:r>
+                        <a:rPr lang="en-US" sz="1400" b="1"/>
+                        <a:t>9. API Layer</a:t>
+                      </a:r>
+                      <a:endParaRPr lang="en-US" sz="1400"/>
+                    </a:p>
+                  </a:txBody>
+                  <a:tcPr marL="70183" marR="70183" marT="35091" marB="35091" anchor="ctr">
+                    <a:lnL w="12700" cap="flat" cmpd="sng" algn="ctr">
+                      <a:solidFill>
+                        <a:schemeClr val="tx1"/>
+                      </a:solidFill>
+                      <a:prstDash val="solid"/>
+                      <a:round/>
+                      <a:headEnd type="none" w="med" len="med"/>
+                      <a:tailEnd type="none" w="med" len="med"/>
+                    </a:lnL>
+                    <a:lnR w="12700" cap="flat" cmpd="sng" algn="ctr">
+                      <a:solidFill>
+                        <a:schemeClr val="tx1"/>
+                      </a:solidFill>
+                      <a:prstDash val="solid"/>
+                      <a:round/>
+                      <a:headEnd type="none" w="med" len="med"/>
+                      <a:tailEnd type="none" w="med" len="med"/>
+                    </a:lnR>
+                    <a:lnT w="12700" cap="flat" cmpd="sng" algn="ctr">
+                      <a:solidFill>
+                        <a:schemeClr val="tx1"/>
+                      </a:solidFill>
+                      <a:prstDash val="solid"/>
+                      <a:round/>
+                      <a:headEnd type="none" w="med" len="med"/>
+                      <a:tailEnd type="none" w="med" len="med"/>
+                    </a:lnT>
+                    <a:lnB w="12700" cap="flat" cmpd="sng" algn="ctr">
+                      <a:solidFill>
+                        <a:schemeClr val="tx1"/>
+                      </a:solidFill>
+                      <a:prstDash val="solid"/>
+                      <a:round/>
+                      <a:headEnd type="none" w="med" len="med"/>
+                      <a:tailEnd type="none" w="med" len="med"/>
+                    </a:lnB>
+                  </a:tcPr>
+                </a:tc>
+                <a:tc>
+                  <a:txBody>
+                    <a:bodyPr/>
+                    <a:lstStyle/>
+                    <a:p>
+                      <a:r>
+                        <a:rPr lang="en-US" sz="1400"/>
+                        <a:t>Serve processed data securely</a:t>
+                      </a:r>
+                    </a:p>
+                  </a:txBody>
+                  <a:tcPr marL="70183" marR="70183" marT="35091" marB="35091" anchor="ctr">
+                    <a:lnL w="12700" cap="flat" cmpd="sng" algn="ctr">
+                      <a:solidFill>
+                        <a:schemeClr val="tx1"/>
+                      </a:solidFill>
+                      <a:prstDash val="solid"/>
+                      <a:round/>
+                      <a:headEnd type="none" w="med" len="med"/>
+                      <a:tailEnd type="none" w="med" len="med"/>
+                    </a:lnL>
+                    <a:lnR w="12700" cap="flat" cmpd="sng" algn="ctr">
+                      <a:solidFill>
+                        <a:schemeClr val="tx1"/>
+                      </a:solidFill>
+                      <a:prstDash val="solid"/>
+                      <a:round/>
+                      <a:headEnd type="none" w="med" len="med"/>
+                      <a:tailEnd type="none" w="med" len="med"/>
+                    </a:lnR>
+                    <a:lnT w="12700" cap="flat" cmpd="sng" algn="ctr">
+                      <a:solidFill>
+                        <a:schemeClr val="tx1"/>
+                      </a:solidFill>
+                      <a:prstDash val="solid"/>
+                      <a:round/>
+                      <a:headEnd type="none" w="med" len="med"/>
+                      <a:tailEnd type="none" w="med" len="med"/>
+                    </a:lnT>
+                    <a:lnB w="12700" cap="flat" cmpd="sng" algn="ctr">
+                      <a:solidFill>
+                        <a:schemeClr val="tx1"/>
+                      </a:solidFill>
+                      <a:prstDash val="solid"/>
+                      <a:round/>
+                      <a:headEnd type="none" w="med" len="med"/>
+                      <a:tailEnd type="none" w="med" len="med"/>
+                    </a:lnB>
+                  </a:tcPr>
+                </a:tc>
+                <a:tc>
+                  <a:txBody>
+                    <a:bodyPr/>
+                    <a:lstStyle/>
+                    <a:p>
+                      <a:r>
+                        <a:rPr lang="en-US" sz="1400" dirty="0" err="1"/>
+                        <a:t>FastAPI</a:t>
+                      </a:r>
+                      <a:r>
+                        <a:rPr lang="en-US" sz="1400" dirty="0"/>
+                        <a:t>, </a:t>
+                      </a:r>
+                      <a:r>
+                        <a:rPr lang="en-US" sz="1400" dirty="0" err="1"/>
+                        <a:t>GraphQL</a:t>
+                      </a:r>
+                      <a:r>
+                        <a:rPr lang="en-US" sz="1400" dirty="0"/>
+                        <a:t>, Flask</a:t>
+                      </a:r>
+                    </a:p>
+                  </a:txBody>
+                  <a:tcPr marL="70183" marR="70183" marT="35091" marB="35091" anchor="ctr">
+                    <a:lnL w="12700" cap="flat" cmpd="sng" algn="ctr">
+                      <a:solidFill>
+                        <a:schemeClr val="tx1"/>
+                      </a:solidFill>
+                      <a:prstDash val="solid"/>
+                      <a:round/>
+                      <a:headEnd type="none" w="med" len="med"/>
+                      <a:tailEnd type="none" w="med" len="med"/>
+                    </a:lnL>
+                    <a:lnR w="12700" cap="flat" cmpd="sng" algn="ctr">
+                      <a:solidFill>
+                        <a:schemeClr val="tx1"/>
+                      </a:solidFill>
+                      <a:prstDash val="solid"/>
+                      <a:round/>
+                      <a:headEnd type="none" w="med" len="med"/>
+                      <a:tailEnd type="none" w="med" len="med"/>
+                    </a:lnR>
+                    <a:lnT w="12700" cap="flat" cmpd="sng" algn="ctr">
+                      <a:solidFill>
+                        <a:schemeClr val="tx1"/>
+                      </a:solidFill>
+                      <a:prstDash val="solid"/>
+                      <a:round/>
+                      <a:headEnd type="none" w="med" len="med"/>
+                      <a:tailEnd type="none" w="med" len="med"/>
+                    </a:lnT>
+                    <a:lnB w="12700" cap="flat" cmpd="sng" algn="ctr">
+                      <a:solidFill>
+                        <a:schemeClr val="tx1"/>
+                      </a:solidFill>
+                      <a:prstDash val="solid"/>
+                      <a:round/>
+                      <a:headEnd type="none" w="med" len="med"/>
+                      <a:tailEnd type="none" w="med" len="med"/>
+                    </a:lnB>
+                  </a:tcPr>
+                </a:tc>
+                <a:extLst>
+                  <a:ext uri="{0D108BD9-81ED-4DB2-BD59-A6C34878D82A}">
+                    <a16:rowId xmlns:a16="http://schemas.microsoft.com/office/drawing/2014/main" val="3281181687"/>
+                  </a:ext>
+                </a:extLst>
+              </a:tr>
+              <a:tr h="551579">
+                <a:tc>
+                  <a:txBody>
+                    <a:bodyPr/>
+                    <a:lstStyle/>
+                    <a:p>
+                      <a:r>
+                        <a:rPr lang="en-US" sz="1400" b="1"/>
+                        <a:t>10. Dashboards</a:t>
+                      </a:r>
+                      <a:endParaRPr lang="en-US" sz="1400"/>
+                    </a:p>
+                  </a:txBody>
+                  <a:tcPr marL="70183" marR="70183" marT="35091" marB="35091" anchor="ctr">
+                    <a:lnL w="12700" cap="flat" cmpd="sng" algn="ctr">
+                      <a:solidFill>
+                        <a:schemeClr val="tx1"/>
+                      </a:solidFill>
+                      <a:prstDash val="solid"/>
+                      <a:round/>
+                      <a:headEnd type="none" w="med" len="med"/>
+                      <a:tailEnd type="none" w="med" len="med"/>
+                    </a:lnL>
+                    <a:lnR w="12700" cap="flat" cmpd="sng" algn="ctr">
+                      <a:solidFill>
+                        <a:schemeClr val="tx1"/>
+                      </a:solidFill>
+                      <a:prstDash val="solid"/>
+                      <a:round/>
+                      <a:headEnd type="none" w="med" len="med"/>
+                      <a:tailEnd type="none" w="med" len="med"/>
+                    </a:lnR>
+                    <a:lnT w="12700" cap="flat" cmpd="sng" algn="ctr">
+                      <a:solidFill>
+                        <a:schemeClr val="tx1"/>
+                      </a:solidFill>
+                      <a:prstDash val="solid"/>
+                      <a:round/>
+                      <a:headEnd type="none" w="med" len="med"/>
+                      <a:tailEnd type="none" w="med" len="med"/>
+                    </a:lnT>
+                    <a:lnB w="12700" cap="flat" cmpd="sng" algn="ctr">
+                      <a:solidFill>
+                        <a:schemeClr val="tx1"/>
+                      </a:solidFill>
+                      <a:prstDash val="solid"/>
+                      <a:round/>
+                      <a:headEnd type="none" w="med" len="med"/>
+                      <a:tailEnd type="none" w="med" len="med"/>
+                    </a:lnB>
+                  </a:tcPr>
+                </a:tc>
+                <a:tc>
+                  <a:txBody>
+                    <a:bodyPr/>
+                    <a:lstStyle/>
+                    <a:p>
+                      <a:r>
+                        <a:rPr lang="en-US" sz="1400"/>
+                        <a:t>Visualize &amp; interact</a:t>
+                      </a:r>
+                    </a:p>
+                  </a:txBody>
+                  <a:tcPr marL="70183" marR="70183" marT="35091" marB="35091" anchor="ctr">
+                    <a:lnL w="12700" cap="flat" cmpd="sng" algn="ctr">
+                      <a:solidFill>
+                        <a:schemeClr val="tx1"/>
+                      </a:solidFill>
+                      <a:prstDash val="solid"/>
+                      <a:round/>
+                      <a:headEnd type="none" w="med" len="med"/>
+                      <a:tailEnd type="none" w="med" len="med"/>
+                    </a:lnL>
+                    <a:lnR w="12700" cap="flat" cmpd="sng" algn="ctr">
+                      <a:solidFill>
+                        <a:schemeClr val="tx1"/>
+                      </a:solidFill>
+                      <a:prstDash val="solid"/>
+                      <a:round/>
+                      <a:headEnd type="none" w="med" len="med"/>
+                      <a:tailEnd type="none" w="med" len="med"/>
+                    </a:lnR>
+                    <a:lnT w="12700" cap="flat" cmpd="sng" algn="ctr">
+                      <a:solidFill>
+                        <a:schemeClr val="tx1"/>
+                      </a:solidFill>
+                      <a:prstDash val="solid"/>
+                      <a:round/>
+                      <a:headEnd type="none" w="med" len="med"/>
+                      <a:tailEnd type="none" w="med" len="med"/>
+                    </a:lnT>
+                    <a:lnB w="12700" cap="flat" cmpd="sng" algn="ctr">
+                      <a:solidFill>
+                        <a:schemeClr val="tx1"/>
+                      </a:solidFill>
+                      <a:prstDash val="solid"/>
+                      <a:round/>
+                      <a:headEnd type="none" w="med" len="med"/>
+                      <a:tailEnd type="none" w="med" len="med"/>
+                    </a:lnB>
+                  </a:tcPr>
+                </a:tc>
+                <a:tc>
+                  <a:txBody>
+                    <a:bodyPr/>
+                    <a:lstStyle/>
+                    <a:p>
+                      <a:r>
+                        <a:rPr lang="en-US" sz="1400" dirty="0"/>
+                        <a:t>React.js, Tailwind, </a:t>
+                      </a:r>
+                      <a:r>
+                        <a:rPr lang="en-US" sz="1400" dirty="0" err="1"/>
+                        <a:t>Plotly</a:t>
+                      </a:r>
+                      <a:r>
+                        <a:rPr lang="en-US" sz="1400" dirty="0"/>
+                        <a:t>, Power BI</a:t>
+                      </a:r>
+                    </a:p>
+                  </a:txBody>
+                  <a:tcPr marL="70183" marR="70183" marT="35091" marB="35091" anchor="ctr">
+                    <a:lnL w="12700" cap="flat" cmpd="sng" algn="ctr">
+                      <a:solidFill>
+                        <a:schemeClr val="tx1"/>
+                      </a:solidFill>
+                      <a:prstDash val="solid"/>
+                      <a:round/>
+                      <a:headEnd type="none" w="med" len="med"/>
+                      <a:tailEnd type="none" w="med" len="med"/>
+                    </a:lnL>
+                    <a:lnR w="12700" cap="flat" cmpd="sng" algn="ctr">
+                      <a:solidFill>
+                        <a:schemeClr val="tx1"/>
+                      </a:solidFill>
+                      <a:prstDash val="solid"/>
+                      <a:round/>
+                      <a:headEnd type="none" w="med" len="med"/>
+                      <a:tailEnd type="none" w="med" len="med"/>
+                    </a:lnR>
+                    <a:lnT w="12700" cap="flat" cmpd="sng" algn="ctr">
+                      <a:solidFill>
+                        <a:schemeClr val="tx1"/>
+                      </a:solidFill>
+                      <a:prstDash val="solid"/>
+                      <a:round/>
+                      <a:headEnd type="none" w="med" len="med"/>
+                      <a:tailEnd type="none" w="med" len="med"/>
+                    </a:lnT>
+                    <a:lnB w="12700" cap="flat" cmpd="sng" algn="ctr">
+                      <a:solidFill>
+                        <a:schemeClr val="tx1"/>
+                      </a:solidFill>
+                      <a:prstDash val="solid"/>
+                      <a:round/>
+                      <a:headEnd type="none" w="med" len="med"/>
+                      <a:tailEnd type="none" w="med" len="med"/>
+                    </a:lnB>
+                  </a:tcPr>
+                </a:tc>
+                <a:extLst>
+                  <a:ext uri="{0D108BD9-81ED-4DB2-BD59-A6C34878D82A}">
+                    <a16:rowId xmlns:a16="http://schemas.microsoft.com/office/drawing/2014/main" val="4179344025"/>
+                  </a:ext>
+                </a:extLst>
+              </a:tr>
+            </a:tbl>
+          </a:graphicData>
+        </a:graphic>
+      </p:graphicFrame>
+      <p:sp>
+        <p:nvSpPr>
+          <p:cNvPr id="4" name="TextBox 3"/>
+          <p:cNvSpPr txBox="1"/>
+          <p:nvPr/>
+        </p:nvSpPr>
+        <p:spPr>
+          <a:xfrm>
+            <a:off x="81482" y="490645"/>
+            <a:ext cx="1394234" cy="369332"/>
+          </a:xfrm>
+          <a:prstGeom prst="rect">
+            <a:avLst/>
+          </a:prstGeom>
+          <a:solidFill>
+            <a:schemeClr val="accent1">
+              <a:lumMod val="75000"/>
+            </a:schemeClr>
+          </a:solidFill>
+        </p:spPr>
+        <p:txBody>
+          <a:bodyPr wrap="square" rtlCol="0">
+            <a:spAutoFit/>
+          </a:bodyPr>
+          <a:lstStyle/>
+          <a:p>
+            <a:r>
+              <a:rPr lang="en-US" b="1" dirty="0" smtClean="0">
+                <a:solidFill>
+                  <a:schemeClr val="bg1"/>
+                </a:solidFill>
+              </a:rPr>
+              <a:t>Framework</a:t>
+            </a:r>
+            <a:endParaRPr lang="en-US" b="1" dirty="0">
+              <a:solidFill>
+                <a:schemeClr val="bg1"/>
+              </a:solidFill>
+            </a:endParaRPr>
+          </a:p>
+        </p:txBody>
+      </p:sp>
+      <p:grpSp>
+        <p:nvGrpSpPr>
+          <p:cNvPr id="23" name="Group 22"/>
+          <p:cNvGrpSpPr/>
+          <p:nvPr/>
+        </p:nvGrpSpPr>
+        <p:grpSpPr>
+          <a:xfrm>
+            <a:off x="81482" y="859951"/>
+            <a:ext cx="5163308" cy="2929440"/>
+            <a:chOff x="47370" y="813996"/>
+            <a:chExt cx="5163308" cy="2929440"/>
+          </a:xfrm>
+        </p:grpSpPr>
+        <p:sp>
+          <p:nvSpPr>
+            <p:cNvPr id="5" name="Rounded Rectangle 4"/>
+            <p:cNvSpPr/>
+            <p:nvPr/>
+          </p:nvSpPr>
+          <p:spPr>
+            <a:xfrm>
+              <a:off x="47370" y="927999"/>
+              <a:ext cx="1394234" cy="692814"/>
+            </a:xfrm>
+            <a:prstGeom prst="roundRect">
+              <a:avLst/>
+            </a:prstGeom>
+          </p:spPr>
+          <p:style>
+            <a:lnRef idx="2">
+              <a:schemeClr val="accent1"/>
+            </a:lnRef>
+            <a:fillRef idx="1">
+              <a:schemeClr val="lt1"/>
+            </a:fillRef>
+            <a:effectRef idx="0">
+              <a:schemeClr val="accent1"/>
+            </a:effectRef>
+            <a:fontRef idx="minor">
+              <a:schemeClr val="dk1"/>
+            </a:fontRef>
+          </p:style>
+          <p:txBody>
+            <a:bodyPr rtlCol="0" anchor="ctr"/>
+            <a:lstStyle/>
+            <a:p>
+              <a:r>
+                <a:rPr lang="en-US" sz="1200" b="1" dirty="0" smtClean="0"/>
+                <a:t>Data source - </a:t>
+              </a:r>
+              <a:r>
+                <a:rPr lang="en-US" sz="1200" dirty="0" err="1" smtClean="0"/>
+                <a:t>TiC</a:t>
+              </a:r>
+              <a:r>
+                <a:rPr lang="en-US" sz="1200" dirty="0" smtClean="0"/>
+                <a:t>, MRF &amp; other directories</a:t>
+              </a:r>
+              <a:endParaRPr lang="en-US" sz="1200" dirty="0"/>
+            </a:p>
+          </p:txBody>
+        </p:sp>
+        <p:sp>
+          <p:nvSpPr>
+            <p:cNvPr id="6" name="Rounded Rectangle 5"/>
+            <p:cNvSpPr/>
+            <p:nvPr/>
+          </p:nvSpPr>
+          <p:spPr>
+            <a:xfrm>
+              <a:off x="1751904" y="877707"/>
+              <a:ext cx="1514396" cy="697015"/>
+            </a:xfrm>
+            <a:prstGeom prst="roundRect">
+              <a:avLst/>
+            </a:prstGeom>
+          </p:spPr>
+          <p:style>
+            <a:lnRef idx="2">
+              <a:schemeClr val="accent1"/>
+            </a:lnRef>
+            <a:fillRef idx="1">
+              <a:schemeClr val="lt1"/>
+            </a:fillRef>
+            <a:effectRef idx="0">
+              <a:schemeClr val="accent1"/>
+            </a:effectRef>
+            <a:fontRef idx="minor">
+              <a:schemeClr val="dk1"/>
+            </a:fontRef>
+          </p:style>
+          <p:txBody>
+            <a:bodyPr rtlCol="0" anchor="ctr"/>
+            <a:lstStyle/>
+            <a:p>
+              <a:r>
+                <a:rPr lang="en-US" sz="1200" b="1" dirty="0"/>
+                <a:t>Ingestion</a:t>
+              </a:r>
+              <a:r>
+                <a:rPr lang="en-US" sz="1200" dirty="0"/>
+                <a:t> - Auto-fetch &amp; validate files </a:t>
+              </a:r>
+            </a:p>
+          </p:txBody>
+        </p:sp>
+        <p:sp>
+          <p:nvSpPr>
+            <p:cNvPr id="7" name="Right Arrow 6"/>
+            <p:cNvSpPr/>
+            <p:nvPr/>
+          </p:nvSpPr>
+          <p:spPr>
+            <a:xfrm>
+              <a:off x="1450638" y="1148175"/>
+              <a:ext cx="318802" cy="156081"/>
+            </a:xfrm>
+            <a:prstGeom prst="rightArrow">
+              <a:avLst/>
+            </a:prstGeom>
+          </p:spPr>
+          <p:style>
+            <a:lnRef idx="2">
+              <a:schemeClr val="accent1">
+                <a:shade val="50000"/>
+              </a:schemeClr>
+            </a:lnRef>
+            <a:fillRef idx="1">
+              <a:schemeClr val="accent1"/>
+            </a:fillRef>
+            <a:effectRef idx="0">
+              <a:schemeClr val="accent1"/>
+            </a:effectRef>
+            <a:fontRef idx="minor">
+              <a:schemeClr val="lt1"/>
+            </a:fontRef>
+          </p:style>
+          <p:txBody>
+            <a:bodyPr rtlCol="0" anchor="ctr"/>
+            <a:lstStyle/>
+            <a:p>
+              <a:pPr algn="ctr"/>
+              <a:endParaRPr lang="en-US"/>
+            </a:p>
+          </p:txBody>
+        </p:sp>
+        <p:sp>
+          <p:nvSpPr>
+            <p:cNvPr id="9" name="Rounded Rectangle 8"/>
+            <p:cNvSpPr/>
+            <p:nvPr/>
+          </p:nvSpPr>
+          <p:spPr>
+            <a:xfrm>
+              <a:off x="3685536" y="813996"/>
+              <a:ext cx="1340269" cy="697015"/>
+            </a:xfrm>
+            <a:prstGeom prst="roundRect">
+              <a:avLst/>
+            </a:prstGeom>
+          </p:spPr>
+          <p:style>
+            <a:lnRef idx="2">
+              <a:schemeClr val="accent1"/>
+            </a:lnRef>
+            <a:fillRef idx="1">
+              <a:schemeClr val="lt1"/>
+            </a:fillRef>
+            <a:effectRef idx="0">
+              <a:schemeClr val="accent1"/>
+            </a:effectRef>
+            <a:fontRef idx="minor">
+              <a:schemeClr val="dk1"/>
+            </a:fontRef>
+          </p:style>
+          <p:txBody>
+            <a:bodyPr rtlCol="0" anchor="ctr"/>
+            <a:lstStyle/>
+            <a:p>
+              <a:r>
+                <a:rPr lang="en-US" sz="1200" b="1" dirty="0" smtClean="0"/>
+                <a:t>Parsing</a:t>
+              </a:r>
+              <a:r>
+                <a:rPr lang="en-US" sz="1200" dirty="0" smtClean="0"/>
+                <a:t> - Flatten JSON/CSV</a:t>
+              </a:r>
+              <a:endParaRPr lang="en-US" sz="1200" dirty="0"/>
+            </a:p>
+          </p:txBody>
+        </p:sp>
+        <p:sp>
+          <p:nvSpPr>
+            <p:cNvPr id="10" name="Right Arrow 9"/>
+            <p:cNvSpPr/>
+            <p:nvPr/>
+          </p:nvSpPr>
+          <p:spPr>
+            <a:xfrm>
+              <a:off x="3273172" y="1086313"/>
+              <a:ext cx="405492" cy="175252"/>
+            </a:xfrm>
+            <a:prstGeom prst="rightArrow">
+              <a:avLst/>
+            </a:prstGeom>
+          </p:spPr>
+          <p:style>
+            <a:lnRef idx="2">
+              <a:schemeClr val="accent1">
+                <a:shade val="50000"/>
+              </a:schemeClr>
+            </a:lnRef>
+            <a:fillRef idx="1">
+              <a:schemeClr val="accent1"/>
+            </a:fillRef>
+            <a:effectRef idx="0">
+              <a:schemeClr val="accent1"/>
+            </a:effectRef>
+            <a:fontRef idx="minor">
+              <a:schemeClr val="lt1"/>
+            </a:fontRef>
+          </p:style>
+          <p:txBody>
+            <a:bodyPr rtlCol="0" anchor="ctr"/>
+            <a:lstStyle/>
+            <a:p>
+              <a:pPr algn="ctr"/>
+              <a:endParaRPr lang="en-US"/>
+            </a:p>
+          </p:txBody>
+        </p:sp>
+        <p:sp>
+          <p:nvSpPr>
+            <p:cNvPr id="11" name="Rounded Rectangle 10"/>
+            <p:cNvSpPr/>
+            <p:nvPr/>
+          </p:nvSpPr>
+          <p:spPr>
+            <a:xfrm>
+              <a:off x="3786407" y="1985449"/>
+              <a:ext cx="1424271" cy="697015"/>
+            </a:xfrm>
+            <a:prstGeom prst="roundRect">
+              <a:avLst/>
+            </a:prstGeom>
+          </p:spPr>
+          <p:style>
+            <a:lnRef idx="2">
+              <a:schemeClr val="accent1"/>
+            </a:lnRef>
+            <a:fillRef idx="1">
+              <a:schemeClr val="lt1"/>
+            </a:fillRef>
+            <a:effectRef idx="0">
+              <a:schemeClr val="accent1"/>
+            </a:effectRef>
+            <a:fontRef idx="minor">
+              <a:schemeClr val="dk1"/>
+            </a:fontRef>
+          </p:style>
+          <p:txBody>
+            <a:bodyPr rtlCol="0" anchor="ctr"/>
+            <a:lstStyle/>
+            <a:p>
+              <a:r>
+                <a:rPr lang="en-US" sz="1200" b="1" dirty="0"/>
+                <a:t>Cleaning - </a:t>
+              </a:r>
+              <a:r>
+                <a:rPr lang="en-US" sz="1200" dirty="0"/>
+                <a:t>Remove errors, outliers </a:t>
+              </a:r>
+            </a:p>
+          </p:txBody>
+        </p:sp>
+        <p:sp>
+          <p:nvSpPr>
+            <p:cNvPr id="12" name="Rounded Rectangle 11"/>
+            <p:cNvSpPr/>
+            <p:nvPr/>
+          </p:nvSpPr>
+          <p:spPr>
+            <a:xfrm>
+              <a:off x="55054" y="1976842"/>
+              <a:ext cx="1449725" cy="760971"/>
+            </a:xfrm>
+            <a:prstGeom prst="roundRect">
+              <a:avLst/>
+            </a:prstGeom>
+          </p:spPr>
+          <p:style>
+            <a:lnRef idx="2">
+              <a:schemeClr val="accent1"/>
+            </a:lnRef>
+            <a:fillRef idx="1">
+              <a:schemeClr val="lt1"/>
+            </a:fillRef>
+            <a:effectRef idx="0">
+              <a:schemeClr val="accent1"/>
+            </a:effectRef>
+            <a:fontRef idx="minor">
+              <a:schemeClr val="dk1"/>
+            </a:fontRef>
+          </p:style>
+          <p:txBody>
+            <a:bodyPr rtlCol="0" anchor="ctr"/>
+            <a:lstStyle/>
+            <a:p>
+              <a:r>
+                <a:rPr lang="en-US" sz="1200" b="1" dirty="0"/>
+                <a:t>Normalization - </a:t>
+              </a:r>
+              <a:r>
+                <a:rPr lang="en-US" sz="1200" dirty="0"/>
+                <a:t>Standardize codes, </a:t>
+              </a:r>
+              <a:r>
+                <a:rPr lang="en-US" sz="1200" dirty="0" smtClean="0"/>
+                <a:t>POS</a:t>
+              </a:r>
+              <a:endParaRPr lang="en-US" sz="1200" dirty="0"/>
+            </a:p>
+          </p:txBody>
+        </p:sp>
+        <p:sp>
+          <p:nvSpPr>
+            <p:cNvPr id="13" name="Rounded Rectangle 12"/>
+            <p:cNvSpPr/>
+            <p:nvPr/>
+          </p:nvSpPr>
+          <p:spPr>
+            <a:xfrm>
+              <a:off x="1828354" y="1971216"/>
+              <a:ext cx="1620803" cy="697015"/>
+            </a:xfrm>
+            <a:prstGeom prst="roundRect">
+              <a:avLst/>
+            </a:prstGeom>
+          </p:spPr>
+          <p:style>
+            <a:lnRef idx="2">
+              <a:schemeClr val="accent1"/>
+            </a:lnRef>
+            <a:fillRef idx="1">
+              <a:schemeClr val="lt1"/>
+            </a:fillRef>
+            <a:effectRef idx="0">
+              <a:schemeClr val="accent1"/>
+            </a:effectRef>
+            <a:fontRef idx="minor">
+              <a:schemeClr val="dk1"/>
+            </a:fontRef>
+          </p:style>
+          <p:txBody>
+            <a:bodyPr rtlCol="0" anchor="ctr"/>
+            <a:lstStyle/>
+            <a:p>
+              <a:r>
+                <a:rPr lang="en-US" sz="1200" b="1" dirty="0"/>
+                <a:t>Identity Graph - </a:t>
+              </a:r>
+              <a:r>
+                <a:rPr lang="en-US" sz="1200" dirty="0"/>
+                <a:t>Link </a:t>
+              </a:r>
+              <a:r>
+                <a:rPr lang="en-US" sz="1200" dirty="0" smtClean="0"/>
+                <a:t>NPI-TIN-Location for unique IDs</a:t>
+              </a:r>
+              <a:endParaRPr lang="en-US" sz="1200" dirty="0"/>
+            </a:p>
+          </p:txBody>
+        </p:sp>
+        <p:sp>
+          <p:nvSpPr>
+            <p:cNvPr id="14" name="Down Arrow 13"/>
+            <p:cNvSpPr/>
+            <p:nvPr/>
+          </p:nvSpPr>
+          <p:spPr>
+            <a:xfrm>
+              <a:off x="4148138" y="1525608"/>
+              <a:ext cx="137955" cy="459841"/>
+            </a:xfrm>
+            <a:prstGeom prst="downArrow">
+              <a:avLst/>
+            </a:prstGeom>
+          </p:spPr>
+          <p:style>
+            <a:lnRef idx="2">
+              <a:schemeClr val="accent1">
+                <a:shade val="50000"/>
+              </a:schemeClr>
+            </a:lnRef>
+            <a:fillRef idx="1">
+              <a:schemeClr val="accent1"/>
+            </a:fillRef>
+            <a:effectRef idx="0">
+              <a:schemeClr val="accent1"/>
+            </a:effectRef>
+            <a:fontRef idx="minor">
+              <a:schemeClr val="lt1"/>
+            </a:fontRef>
+          </p:style>
+          <p:txBody>
+            <a:bodyPr rtlCol="0" anchor="ctr"/>
+            <a:lstStyle/>
+            <a:p>
+              <a:pPr algn="ctr"/>
+              <a:endParaRPr lang="en-US"/>
+            </a:p>
+          </p:txBody>
+        </p:sp>
+        <p:sp>
+          <p:nvSpPr>
+            <p:cNvPr id="15" name="Right Arrow 14"/>
+            <p:cNvSpPr/>
+            <p:nvPr/>
+          </p:nvSpPr>
+          <p:spPr>
+            <a:xfrm rot="10800000">
+              <a:off x="3449156" y="2244095"/>
+              <a:ext cx="337250" cy="146176"/>
+            </a:xfrm>
+            <a:prstGeom prst="rightArrow">
+              <a:avLst/>
+            </a:prstGeom>
+          </p:spPr>
+          <p:style>
+            <a:lnRef idx="2">
+              <a:schemeClr val="accent1">
+                <a:shade val="50000"/>
+              </a:schemeClr>
+            </a:lnRef>
+            <a:fillRef idx="1">
+              <a:schemeClr val="accent1"/>
+            </a:fillRef>
+            <a:effectRef idx="0">
+              <a:schemeClr val="accent1"/>
+            </a:effectRef>
+            <a:fontRef idx="minor">
+              <a:schemeClr val="lt1"/>
+            </a:fontRef>
+          </p:style>
+          <p:txBody>
+            <a:bodyPr rtlCol="0" anchor="ctr"/>
+            <a:lstStyle/>
+            <a:p>
+              <a:pPr algn="ctr"/>
+              <a:endParaRPr lang="en-US"/>
+            </a:p>
+          </p:txBody>
+        </p:sp>
+        <p:sp>
+          <p:nvSpPr>
+            <p:cNvPr id="16" name="Rounded Rectangle 15"/>
+            <p:cNvSpPr/>
+            <p:nvPr/>
+          </p:nvSpPr>
+          <p:spPr>
+            <a:xfrm>
+              <a:off x="2036140" y="3046421"/>
+              <a:ext cx="1352351" cy="697015"/>
+            </a:xfrm>
+            <a:prstGeom prst="roundRect">
+              <a:avLst/>
+            </a:prstGeom>
+          </p:spPr>
+          <p:style>
+            <a:lnRef idx="2">
+              <a:schemeClr val="accent1"/>
+            </a:lnRef>
+            <a:fillRef idx="1">
+              <a:schemeClr val="lt1"/>
+            </a:fillRef>
+            <a:effectRef idx="0">
+              <a:schemeClr val="accent1"/>
+            </a:effectRef>
+            <a:fontRef idx="minor">
+              <a:schemeClr val="dk1"/>
+            </a:fontRef>
+          </p:style>
+          <p:txBody>
+            <a:bodyPr rtlCol="0" anchor="ctr"/>
+            <a:lstStyle/>
+            <a:p>
+              <a:r>
+                <a:rPr lang="en-US" sz="1200" b="1" dirty="0"/>
+                <a:t>Curated Data Store </a:t>
+              </a:r>
+              <a:r>
+                <a:rPr lang="en-US" sz="1200" dirty="0"/>
+                <a:t>- Clean, query-ready DB</a:t>
+              </a:r>
+            </a:p>
+          </p:txBody>
+        </p:sp>
+        <p:sp>
+          <p:nvSpPr>
+            <p:cNvPr id="17" name="Rounded Rectangle 16"/>
+            <p:cNvSpPr/>
+            <p:nvPr/>
+          </p:nvSpPr>
+          <p:spPr>
+            <a:xfrm>
+              <a:off x="91453" y="3025734"/>
+              <a:ext cx="1505214" cy="697015"/>
+            </a:xfrm>
+            <a:prstGeom prst="roundRect">
+              <a:avLst/>
+            </a:prstGeom>
+          </p:spPr>
+          <p:style>
+            <a:lnRef idx="2">
+              <a:schemeClr val="accent1"/>
+            </a:lnRef>
+            <a:fillRef idx="1">
+              <a:schemeClr val="lt1"/>
+            </a:fillRef>
+            <a:effectRef idx="0">
+              <a:schemeClr val="accent1"/>
+            </a:effectRef>
+            <a:fontRef idx="minor">
+              <a:schemeClr val="dk1"/>
+            </a:fontRef>
+          </p:style>
+          <p:txBody>
+            <a:bodyPr rtlCol="0" anchor="ctr"/>
+            <a:lstStyle/>
+            <a:p>
+              <a:r>
+                <a:rPr lang="en-US" sz="1200" b="1" dirty="0"/>
+                <a:t>Analytics &amp; Modeling  </a:t>
+              </a:r>
+              <a:r>
+                <a:rPr lang="en-US" sz="1200" dirty="0"/>
+                <a:t>- Risk, cost, </a:t>
+              </a:r>
+              <a:r>
+                <a:rPr lang="en-US" sz="1200" dirty="0" smtClean="0"/>
+                <a:t>adequacy</a:t>
+              </a:r>
+              <a:endParaRPr lang="en-US" sz="1200" dirty="0"/>
+            </a:p>
+          </p:txBody>
+        </p:sp>
+        <p:sp>
+          <p:nvSpPr>
+            <p:cNvPr id="18" name="Right Arrow 17"/>
+            <p:cNvSpPr/>
+            <p:nvPr/>
+          </p:nvSpPr>
+          <p:spPr>
+            <a:xfrm rot="10800000">
+              <a:off x="1507298" y="2211151"/>
+              <a:ext cx="321056" cy="136430"/>
+            </a:xfrm>
+            <a:prstGeom prst="rightArrow">
+              <a:avLst/>
+            </a:prstGeom>
+          </p:spPr>
+          <p:style>
+            <a:lnRef idx="2">
+              <a:schemeClr val="accent1">
+                <a:shade val="50000"/>
+              </a:schemeClr>
+            </a:lnRef>
+            <a:fillRef idx="1">
+              <a:schemeClr val="accent1"/>
+            </a:fillRef>
+            <a:effectRef idx="0">
+              <a:schemeClr val="accent1"/>
+            </a:effectRef>
+            <a:fontRef idx="minor">
+              <a:schemeClr val="lt1"/>
+            </a:fontRef>
+          </p:style>
+          <p:txBody>
+            <a:bodyPr rtlCol="0" anchor="ctr"/>
+            <a:lstStyle/>
+            <a:p>
+              <a:pPr algn="ctr"/>
+              <a:endParaRPr lang="en-US"/>
+            </a:p>
+          </p:txBody>
+        </p:sp>
+        <p:sp>
+          <p:nvSpPr>
+            <p:cNvPr id="20" name="Rounded Rectangle 19"/>
+            <p:cNvSpPr/>
+            <p:nvPr/>
+          </p:nvSpPr>
+          <p:spPr>
+            <a:xfrm>
+              <a:off x="3827964" y="3046421"/>
+              <a:ext cx="1333095" cy="697015"/>
+            </a:xfrm>
+            <a:prstGeom prst="roundRect">
+              <a:avLst/>
+            </a:prstGeom>
+          </p:spPr>
+          <p:style>
+            <a:lnRef idx="2">
+              <a:schemeClr val="accent1"/>
+            </a:lnRef>
+            <a:fillRef idx="1">
+              <a:schemeClr val="lt1"/>
+            </a:fillRef>
+            <a:effectRef idx="0">
+              <a:schemeClr val="accent1"/>
+            </a:effectRef>
+            <a:fontRef idx="minor">
+              <a:schemeClr val="dk1"/>
+            </a:fontRef>
+          </p:style>
+          <p:txBody>
+            <a:bodyPr rtlCol="0" anchor="ctr"/>
+            <a:lstStyle/>
+            <a:p>
+              <a:r>
+                <a:rPr lang="en-US" sz="1200" b="1" dirty="0"/>
+                <a:t>API Layer - </a:t>
+              </a:r>
+              <a:r>
+                <a:rPr lang="en-US" sz="1200" dirty="0"/>
+                <a:t>role-based </a:t>
+              </a:r>
+              <a:r>
+                <a:rPr lang="en-US" sz="1200" dirty="0" smtClean="0"/>
+                <a:t>security </a:t>
+              </a:r>
+              <a:r>
+                <a:rPr lang="en-US" sz="1200" dirty="0" smtClean="0">
+                  <a:sym typeface="Wingdings" panose="05000000000000000000" pitchFamily="2" charset="2"/>
+                </a:rPr>
+                <a:t> </a:t>
+              </a:r>
+              <a:r>
+                <a:rPr lang="en-US" sz="1200" b="1" u="sng" dirty="0" smtClean="0">
+                  <a:sym typeface="Wingdings" panose="05000000000000000000" pitchFamily="2" charset="2"/>
+                </a:rPr>
+                <a:t>Dashboard</a:t>
+              </a:r>
+              <a:r>
+                <a:rPr lang="en-US" sz="1200" dirty="0" smtClean="0"/>
+                <a:t> </a:t>
+              </a:r>
+              <a:endParaRPr lang="en-US" sz="1200" dirty="0"/>
+            </a:p>
+          </p:txBody>
+        </p:sp>
+        <p:sp>
+          <p:nvSpPr>
+            <p:cNvPr id="21" name="Right Arrow 20"/>
+            <p:cNvSpPr/>
+            <p:nvPr/>
+          </p:nvSpPr>
+          <p:spPr>
+            <a:xfrm>
+              <a:off x="1591238" y="3297682"/>
+              <a:ext cx="424779" cy="137044"/>
+            </a:xfrm>
+            <a:prstGeom prst="rightArrow">
+              <a:avLst/>
+            </a:prstGeom>
+          </p:spPr>
+          <p:style>
+            <a:lnRef idx="2">
+              <a:schemeClr val="accent1">
+                <a:shade val="50000"/>
+              </a:schemeClr>
+            </a:lnRef>
+            <a:fillRef idx="1">
+              <a:schemeClr val="accent1"/>
+            </a:fillRef>
+            <a:effectRef idx="0">
+              <a:schemeClr val="accent1"/>
+            </a:effectRef>
+            <a:fontRef idx="minor">
+              <a:schemeClr val="lt1"/>
+            </a:fontRef>
+          </p:style>
+          <p:txBody>
+            <a:bodyPr rtlCol="0" anchor="ctr"/>
+            <a:lstStyle/>
+            <a:p>
+              <a:pPr algn="ctr"/>
+              <a:endParaRPr lang="en-US"/>
+            </a:p>
+          </p:txBody>
+        </p:sp>
+        <p:sp>
+          <p:nvSpPr>
+            <p:cNvPr id="22" name="Right Arrow 21"/>
+            <p:cNvSpPr/>
+            <p:nvPr/>
+          </p:nvSpPr>
+          <p:spPr>
+            <a:xfrm>
+              <a:off x="3389517" y="3297682"/>
+              <a:ext cx="438447" cy="117866"/>
+            </a:xfrm>
+            <a:prstGeom prst="rightArrow">
+              <a:avLst/>
+            </a:prstGeom>
+          </p:spPr>
+          <p:style>
+            <a:lnRef idx="2">
+              <a:schemeClr val="accent1">
+                <a:shade val="50000"/>
+              </a:schemeClr>
+            </a:lnRef>
+            <a:fillRef idx="1">
+              <a:schemeClr val="accent1"/>
+            </a:fillRef>
+            <a:effectRef idx="0">
+              <a:schemeClr val="accent1"/>
+            </a:effectRef>
+            <a:fontRef idx="minor">
+              <a:schemeClr val="lt1"/>
+            </a:fontRef>
+          </p:style>
+          <p:txBody>
+            <a:bodyPr rtlCol="0" anchor="ctr"/>
+            <a:lstStyle/>
+            <a:p>
+              <a:pPr algn="ctr"/>
+              <a:endParaRPr lang="en-US"/>
+            </a:p>
+          </p:txBody>
+        </p:sp>
+      </p:grpSp>
     </p:spTree>
     <p:extLst>
       <p:ext uri="{BB962C8B-B14F-4D97-AF65-F5344CB8AC3E}">
@@ -5203,6 +9269,13 @@
   <p:clrMapOvr>
     <a:masterClrMapping/>
   </p:clrMapOvr>
+  <p:timing>
+    <p:tnLst>
+      <p:par>
+        <p:cTn id="1" dur="indefinite" restart="never" nodeType="tmRoot"/>
+      </p:par>
+    </p:tnLst>
+  </p:timing>
 </p:sld>
 </file>
 
@@ -5811,4 +9884,265 @@
     </a:ext>
   </a:extLst>
 </a:theme>
+</file>
+
+<file path=ppt/theme/theme2.xml><?xml version="1.0" encoding="utf-8"?>
+<a:theme xmlns:a="http://schemas.openxmlformats.org/drawingml/2006/main" name="Office Theme">
+  <a:themeElements>
+    <a:clrScheme name="Office">
+      <a:dk1>
+        <a:sysClr val="windowText" lastClr="000000"/>
+      </a:dk1>
+      <a:lt1>
+        <a:sysClr val="window" lastClr="FFFFFF"/>
+      </a:lt1>
+      <a:dk2>
+        <a:srgbClr val="44546A"/>
+      </a:dk2>
+      <a:lt2>
+        <a:srgbClr val="E7E6E6"/>
+      </a:lt2>
+      <a:accent1>
+        <a:srgbClr val="5B9BD5"/>
+      </a:accent1>
+      <a:accent2>
+        <a:srgbClr val="ED7D31"/>
+      </a:accent2>
+      <a:accent3>
+        <a:srgbClr val="A5A5A5"/>
+      </a:accent3>
+      <a:accent4>
+        <a:srgbClr val="FFC000"/>
+      </a:accent4>
+      <a:accent5>
+        <a:srgbClr val="4472C4"/>
+      </a:accent5>
+      <a:accent6>
+        <a:srgbClr val="70AD47"/>
+      </a:accent6>
+      <a:hlink>
+        <a:srgbClr val="0563C1"/>
+      </a:hlink>
+      <a:folHlink>
+        <a:srgbClr val="954F72"/>
+      </a:folHlink>
+    </a:clrScheme>
+    <a:fontScheme name="Office">
+      <a:majorFont>
+        <a:latin typeface="Calibri Light" panose="020F0302020204030204"/>
+        <a:ea typeface=""/>
+        <a:cs typeface=""/>
+        <a:font script="Jpan" typeface="游ゴシック Light"/>
+        <a:font script="Hang" typeface="맑은 고딕"/>
+        <a:font script="Hans" typeface="等线 Light"/>
+        <a:font script="Hant" typeface="新細明體"/>
+        <a:font script="Arab" typeface="Times New Roman"/>
+        <a:font script="Hebr" typeface="Times New Roman"/>
+        <a:font script="Thai" typeface="Angsana New"/>
+        <a:font script="Ethi" typeface="Nyala"/>
+        <a:font script="Beng" typeface="Vrinda"/>
+        <a:font script="Gujr" typeface="Shruti"/>
+        <a:font script="Khmr" typeface="MoolBoran"/>
+        <a:font script="Knda" typeface="Tunga"/>
+        <a:font script="Guru" typeface="Raavi"/>
+        <a:font script="Cans" typeface="Euphemia"/>
+        <a:font script="Cher" typeface="Plantagenet Cherokee"/>
+        <a:font script="Yiii" typeface="Microsoft Yi Baiti"/>
+        <a:font script="Tibt" typeface="Microsoft Himalaya"/>
+        <a:font script="Thaa" typeface="MV Boli"/>
+        <a:font script="Deva" typeface="Mangal"/>
+        <a:font script="Telu" typeface="Gautami"/>
+        <a:font script="Taml" typeface="Latha"/>
+        <a:font script="Syrc" typeface="Estrangelo Edessa"/>
+        <a:font script="Orya" typeface="Kalinga"/>
+        <a:font script="Mlym" typeface="Kartika"/>
+        <a:font script="Laoo" typeface="DokChampa"/>
+        <a:font script="Sinh" typeface="Iskoola Pota"/>
+        <a:font script="Mong" typeface="Mongolian Baiti"/>
+        <a:font script="Viet" typeface="Times New Roman"/>
+        <a:font script="Uigh" typeface="Microsoft Uighur"/>
+        <a:font script="Geor" typeface="Sylfaen"/>
+      </a:majorFont>
+      <a:minorFont>
+        <a:latin typeface="Calibri" panose="020F0502020204030204"/>
+        <a:ea typeface=""/>
+        <a:cs typeface=""/>
+        <a:font script="Jpan" typeface="游ゴシック"/>
+        <a:font script="Hang" typeface="맑은 고딕"/>
+        <a:font script="Hans" typeface="等线"/>
+        <a:font script="Hant" typeface="新細明體"/>
+        <a:font script="Arab" typeface="Arial"/>
+        <a:font script="Hebr" typeface="Arial"/>
+        <a:font script="Thai" typeface="Cordia New"/>
+        <a:font script="Ethi" typeface="Nyala"/>
+        <a:font script="Beng" typeface="Vrinda"/>
+        <a:font script="Gujr" typeface="Shruti"/>
+        <a:font script="Khmr" typeface="DaunPenh"/>
+        <a:font script="Knda" typeface="Tunga"/>
+        <a:font script="Guru" typeface="Raavi"/>
+        <a:font script="Cans" typeface="Euphemia"/>
+        <a:font script="Cher" typeface="Plantagenet Cherokee"/>
+        <a:font script="Yiii" typeface="Microsoft Yi Baiti"/>
+        <a:font script="Tibt" typeface="Microsoft Himalaya"/>
+        <a:font script="Thaa" typeface="MV Boli"/>
+        <a:font script="Deva" typeface="Mangal"/>
+        <a:font script="Telu" typeface="Gautami"/>
+        <a:font script="Taml" typeface="Latha"/>
+        <a:font script="Syrc" typeface="Estrangelo Edessa"/>
+        <a:font script="Orya" typeface="Kalinga"/>
+        <a:font script="Mlym" typeface="Kartika"/>
+        <a:font script="Laoo" typeface="DokChampa"/>
+        <a:font script="Sinh" typeface="Iskoola Pota"/>
+        <a:font script="Mong" typeface="Mongolian Baiti"/>
+        <a:font script="Viet" typeface="Arial"/>
+        <a:font script="Uigh" typeface="Microsoft Uighur"/>
+        <a:font script="Geor" typeface="Sylfaen"/>
+      </a:minorFont>
+    </a:fontScheme>
+    <a:fmtScheme name="Office">
+      <a:fillStyleLst>
+        <a:solidFill>
+          <a:schemeClr val="phClr"/>
+        </a:solidFill>
+        <a:gradFill rotWithShape="1">
+          <a:gsLst>
+            <a:gs pos="0">
+              <a:schemeClr val="phClr">
+                <a:lumMod val="110000"/>
+                <a:satMod val="105000"/>
+                <a:tint val="67000"/>
+              </a:schemeClr>
+            </a:gs>
+            <a:gs pos="50000">
+              <a:schemeClr val="phClr">
+                <a:lumMod val="105000"/>
+                <a:satMod val="103000"/>
+                <a:tint val="73000"/>
+              </a:schemeClr>
+            </a:gs>
+            <a:gs pos="100000">
+              <a:schemeClr val="phClr">
+                <a:lumMod val="105000"/>
+                <a:satMod val="109000"/>
+                <a:tint val="81000"/>
+              </a:schemeClr>
+            </a:gs>
+          </a:gsLst>
+          <a:lin ang="5400000" scaled="0"/>
+        </a:gradFill>
+        <a:gradFill rotWithShape="1">
+          <a:gsLst>
+            <a:gs pos="0">
+              <a:schemeClr val="phClr">
+                <a:satMod val="103000"/>
+                <a:lumMod val="102000"/>
+                <a:tint val="94000"/>
+              </a:schemeClr>
+            </a:gs>
+            <a:gs pos="50000">
+              <a:schemeClr val="phClr">
+                <a:satMod val="110000"/>
+                <a:lumMod val="100000"/>
+                <a:shade val="100000"/>
+              </a:schemeClr>
+            </a:gs>
+            <a:gs pos="100000">
+              <a:schemeClr val="phClr">
+                <a:lumMod val="99000"/>
+                <a:satMod val="120000"/>
+                <a:shade val="78000"/>
+              </a:schemeClr>
+            </a:gs>
+          </a:gsLst>
+          <a:lin ang="5400000" scaled="0"/>
+        </a:gradFill>
+      </a:fillStyleLst>
+      <a:lnStyleLst>
+        <a:ln w="6350" cap="flat" cmpd="sng" algn="ctr">
+          <a:solidFill>
+            <a:schemeClr val="phClr"/>
+          </a:solidFill>
+          <a:prstDash val="solid"/>
+          <a:miter lim="800000"/>
+        </a:ln>
+        <a:ln w="12700" cap="flat" cmpd="sng" algn="ctr">
+          <a:solidFill>
+            <a:schemeClr val="phClr"/>
+          </a:solidFill>
+          <a:prstDash val="solid"/>
+          <a:miter lim="800000"/>
+        </a:ln>
+        <a:ln w="19050" cap="flat" cmpd="sng" algn="ctr">
+          <a:solidFill>
+            <a:schemeClr val="phClr"/>
+          </a:solidFill>
+          <a:prstDash val="solid"/>
+          <a:miter lim="800000"/>
+        </a:ln>
+      </a:lnStyleLst>
+      <a:effectStyleLst>
+        <a:effectStyle>
+          <a:effectLst/>
+        </a:effectStyle>
+        <a:effectStyle>
+          <a:effectLst/>
+        </a:effectStyle>
+        <a:effectStyle>
+          <a:effectLst>
+            <a:outerShdw blurRad="57150" dist="19050" dir="5400000" algn="ctr" rotWithShape="0">
+              <a:srgbClr val="000000">
+                <a:alpha val="63000"/>
+              </a:srgbClr>
+            </a:outerShdw>
+          </a:effectLst>
+        </a:effectStyle>
+      </a:effectStyleLst>
+      <a:bgFillStyleLst>
+        <a:solidFill>
+          <a:schemeClr val="phClr"/>
+        </a:solidFill>
+        <a:solidFill>
+          <a:schemeClr val="phClr">
+            <a:tint val="95000"/>
+            <a:satMod val="170000"/>
+          </a:schemeClr>
+        </a:solidFill>
+        <a:gradFill rotWithShape="1">
+          <a:gsLst>
+            <a:gs pos="0">
+              <a:schemeClr val="phClr">
+                <a:tint val="93000"/>
+                <a:satMod val="150000"/>
+                <a:shade val="98000"/>
+                <a:lumMod val="102000"/>
+              </a:schemeClr>
+            </a:gs>
+            <a:gs pos="50000">
+              <a:schemeClr val="phClr">
+                <a:tint val="98000"/>
+                <a:satMod val="130000"/>
+                <a:shade val="90000"/>
+                <a:lumMod val="103000"/>
+              </a:schemeClr>
+            </a:gs>
+            <a:gs pos="100000">
+              <a:schemeClr val="phClr">
+                <a:shade val="63000"/>
+                <a:satMod val="120000"/>
+              </a:schemeClr>
+            </a:gs>
+          </a:gsLst>
+          <a:lin ang="5400000" scaled="0"/>
+        </a:gradFill>
+      </a:bgFillStyleLst>
+    </a:fmtScheme>
+  </a:themeElements>
+  <a:objectDefaults/>
+  <a:extraClrSchemeLst/>
+  <a:extLst>
+    <a:ext uri="{05A4C25C-085E-4340-85A3-A5531E510DB2}">
+      <thm15:themeFamily xmlns:thm15="http://schemas.microsoft.com/office/thememl/2012/main" name="Office Theme" id="{62F939B6-93AF-4DB8-9C6B-D6C7DFDC589F}" vid="{4A3C46E8-61CC-4603-A589-7422A47A8E4A}"/>
+    </a:ext>
+  </a:extLst>
+</a:theme>
 </file>
</xml_diff>